<commit_message>
docs: Write Terminatin a Session of Section 15
</commit_message>
<xml_diff>
--- a/세미나 2차.pptx
+++ b/세미나 2차.pptx
@@ -5,10 +5,10 @@
     <p:sldMasterId id="2147483648" r:id="rId1"/>
   </p:sldMasterIdLst>
   <p:notesMasterIdLst>
-    <p:notesMasterId r:id="rId30"/>
+    <p:notesMasterId r:id="rId33"/>
   </p:notesMasterIdLst>
   <p:handoutMasterIdLst>
-    <p:handoutMasterId r:id="rId31"/>
+    <p:handoutMasterId r:id="rId34"/>
   </p:handoutMasterIdLst>
   <p:sldIdLst>
     <p:sldId id="264" r:id="rId2"/>
@@ -39,6 +39,9 @@
     <p:sldId id="261" r:id="rId27"/>
     <p:sldId id="262" r:id="rId28"/>
     <p:sldId id="263" r:id="rId29"/>
+    <p:sldId id="287" r:id="rId30"/>
+    <p:sldId id="289" r:id="rId31"/>
+    <p:sldId id="290" r:id="rId32"/>
   </p:sldIdLst>
   <p:sldSz cx="12192000" cy="6858000"/>
   <p:notesSz cx="6858000" cy="9144000"/>
@@ -242,7 +245,7 @@
           <a:p>
             <a:fld id="{8D7A30CD-047B-418C-B390-82335D751AE2}" type="datetimeFigureOut">
               <a:rPr lang="ko-KR" altLang="en-US" smtClean="0"/>
-              <a:t>2023-06-29</a:t>
+              <a:t>2023-07-02</a:t>
             </a:fld>
             <a:endParaRPr lang="ko-KR" altLang="en-US"/>
           </a:p>
@@ -419,7 +422,7 @@
           <a:p>
             <a:fld id="{697B1179-EA2C-4F66-A7B6-E78EE214E3F0}" type="datetimeFigureOut">
               <a:rPr lang="ko-KR" altLang="en-US" smtClean="0"/>
-              <a:t>2023-06-29</a:t>
+              <a:t>2023-07-02</a:t>
             </a:fld>
             <a:endParaRPr lang="ko-KR" altLang="en-US"/>
           </a:p>
@@ -9130,22 +9133,22 @@
               </a:lnSpc>
             </a:pPr>
             <a:r>
-              <a:rPr lang="en-US" altLang="ko-KR" sz="2000" b="1">
+              <a:rPr lang="en-US" altLang="ko-KR" sz="2000" b="1" dirty="0">
                 <a:latin typeface="Roboto" panose="02000000000000000000" pitchFamily="2" charset="0"/>
                 <a:ea typeface="Roboto" panose="02000000000000000000" pitchFamily="2" charset="0"/>
               </a:rPr>
               <a:t>Dialog</a:t>
             </a:r>
             <a:r>
-              <a:rPr lang="en-US" altLang="ko-KR"/>
+              <a:rPr lang="en-US" altLang="ko-KR" dirty="0"/>
               <a:t> </a:t>
             </a:r>
             <a:r>
-              <a:rPr lang="ko-KR" altLang="en-US"/>
+              <a:rPr lang="ko-KR" altLang="en-US" dirty="0"/>
               <a:t>란</a:t>
             </a:r>
             <a:r>
-              <a:rPr lang="en-US" altLang="ko-KR"/>
+              <a:rPr lang="en-US" altLang="ko-KR" dirty="0"/>
               <a:t>? </a:t>
             </a:r>
           </a:p>
@@ -9156,22 +9159,22 @@
               </a:lnSpc>
             </a:pPr>
             <a:r>
-              <a:rPr lang="ko-KR" altLang="en-US" sz="1600"/>
+              <a:rPr lang="ko-KR" altLang="en-US" sz="1600" dirty="0"/>
               <a:t>일정시간 동안 유지되는 두 </a:t>
             </a:r>
             <a:r>
-              <a:rPr lang="en-US" altLang="ko-KR" sz="1600"/>
+              <a:rPr lang="en-US" altLang="ko-KR" sz="1600" dirty="0"/>
               <a:t>user agent </a:t>
             </a:r>
             <a:r>
-              <a:rPr lang="ko-KR" altLang="en-US" sz="1600"/>
+              <a:rPr lang="ko-KR" altLang="en-US" sz="1600" dirty="0"/>
               <a:t>사이의 </a:t>
             </a:r>
             <a:r>
-              <a:rPr lang="en-US" altLang="ko-KR" sz="1600"/>
+              <a:rPr lang="en-US" altLang="ko-KR" sz="1600" dirty="0"/>
               <a:t>peer-to-peer SIP relationship</a:t>
             </a:r>
-            <a:endParaRPr lang="ko-KR" altLang="en-US" sz="1600"/>
+            <a:endParaRPr lang="ko-KR" altLang="en-US" sz="1600" dirty="0"/>
           </a:p>
         </p:txBody>
       </p:sp>
@@ -15259,12 +15262,153 @@
           </a:p>
         </p:txBody>
       </p:sp>
+      <p:sp>
+        <p:nvSpPr>
+          <p:cNvPr id="18" name="TextBox 17">
+            <a:extLst>
+              <a:ext uri="{FF2B5EF4-FFF2-40B4-BE49-F238E27FC236}">
+                <a16:creationId xmlns:a16="http://schemas.microsoft.com/office/drawing/2014/main" id="{2162534D-1E2A-49CE-BFBD-06634162076E}"/>
+              </a:ext>
+            </a:extLst>
+          </p:cNvPr>
+          <p:cNvSpPr txBox="1"/>
+          <p:nvPr/>
+        </p:nvSpPr>
+        <p:spPr>
+          <a:xfrm>
+            <a:off x="7096526" y="3429000"/>
+            <a:ext cx="4647027" cy="1815882"/>
+          </a:xfrm>
+          <a:prstGeom prst="rect">
+            <a:avLst/>
+          </a:prstGeom>
+          <a:noFill/>
+        </p:spPr>
+        <p:txBody>
+          <a:bodyPr wrap="square" rtlCol="0">
+            <a:spAutoFit/>
+          </a:bodyPr>
+          <a:lstStyle/>
+          <a:p>
+            <a:r>
+              <a:rPr lang="en-US" altLang="ko-KR" sz="1400" b="1" dirty="0">
+                <a:latin typeface="Roboto" panose="02000000000000000000" pitchFamily="2" charset="0"/>
+                <a:ea typeface="Roboto" panose="02000000000000000000" pitchFamily="2" charset="0"/>
+              </a:rPr>
+              <a:t>Redirect Server </a:t>
+            </a:r>
+            <a:r>
+              <a:rPr lang="ko-KR" altLang="en-US" sz="1400" b="1" dirty="0"/>
+              <a:t>특징</a:t>
+            </a:r>
+            <a:r>
+              <a:rPr lang="en-US" altLang="ko-KR" sz="1400" dirty="0"/>
+              <a:t>:</a:t>
+            </a:r>
+          </a:p>
+          <a:p>
+            <a:endParaRPr lang="en-US" altLang="ko-KR" sz="1400" dirty="0"/>
+          </a:p>
+          <a:p>
+            <a:pPr marL="285750" indent="-285750">
+              <a:buFont typeface="Arial" panose="020B0604020202020204" pitchFamily="34" charset="0"/>
+              <a:buChar char="•"/>
+            </a:pPr>
+            <a:r>
+              <a:rPr lang="ko-KR" altLang="en-US" sz="1400" dirty="0"/>
+              <a:t>자체적으로 </a:t>
+            </a:r>
+            <a:r>
+              <a:rPr lang="en-US" altLang="ko-KR" sz="1400" dirty="0"/>
+              <a:t>SIP </a:t>
+            </a:r>
+            <a:r>
+              <a:rPr lang="ko-KR" altLang="en-US" sz="1400" dirty="0"/>
+              <a:t>요청을 발행하지 않음</a:t>
+            </a:r>
+            <a:r>
+              <a:rPr lang="en-US" altLang="ko-KR" sz="1400" dirty="0"/>
+              <a:t>.</a:t>
+            </a:r>
+          </a:p>
+          <a:p>
+            <a:pPr marL="285750" indent="-285750">
+              <a:buFont typeface="Arial" panose="020B0604020202020204" pitchFamily="34" charset="0"/>
+              <a:buChar char="•"/>
+            </a:pPr>
+            <a:endParaRPr lang="en-US" altLang="ko-KR" sz="1400" dirty="0"/>
+          </a:p>
+          <a:p>
+            <a:pPr marL="285750" indent="-285750">
+              <a:buFont typeface="Arial" panose="020B0604020202020204" pitchFamily="34" charset="0"/>
+              <a:buChar char="•"/>
+            </a:pPr>
+            <a:r>
+              <a:rPr lang="en-US" altLang="ko-KR" sz="1400" dirty="0"/>
+              <a:t>CANCEL </a:t>
+            </a:r>
+            <a:r>
+              <a:rPr lang="ko-KR" altLang="en-US" sz="1400" dirty="0"/>
+              <a:t>이외의 요청을 수신한 후 거부하거나 </a:t>
+            </a:r>
+            <a:r>
+              <a:rPr lang="en-US" altLang="ko-KR" sz="1400" dirty="0"/>
+              <a:t>location service</a:t>
+            </a:r>
+            <a:r>
+              <a:rPr lang="ko-KR" altLang="en-US" sz="1400" dirty="0"/>
+              <a:t>로 부터 데이터를 수집하여 </a:t>
+            </a:r>
+            <a:r>
+              <a:rPr lang="en-US" altLang="ko-KR" sz="1400" dirty="0"/>
+              <a:t>3xx</a:t>
+            </a:r>
+            <a:r>
+              <a:rPr lang="ko-KR" altLang="en-US" sz="1400" dirty="0"/>
+              <a:t> 최종 응답을 반환</a:t>
+            </a:r>
+            <a:r>
+              <a:rPr lang="en-US" altLang="ko-KR" sz="1400" dirty="0"/>
+              <a:t>.</a:t>
+            </a:r>
+          </a:p>
+          <a:p>
+            <a:pPr marL="285750" indent="-285750">
+              <a:buFont typeface="Arial" panose="020B0604020202020204" pitchFamily="34" charset="0"/>
+              <a:buChar char="•"/>
+            </a:pPr>
+            <a:endParaRPr lang="en-US" altLang="ko-KR" sz="1400" dirty="0"/>
+          </a:p>
+          <a:p>
+            <a:pPr marL="285750" indent="-285750">
+              <a:buFont typeface="Arial" panose="020B0604020202020204" pitchFamily="34" charset="0"/>
+              <a:buChar char="•"/>
+            </a:pPr>
+            <a:r>
+              <a:rPr lang="ko-KR" altLang="en-US" sz="1400" dirty="0"/>
+              <a:t>인식할 수 없는 헤더 필드는 무시하고 해당 </a:t>
+            </a:r>
+            <a:r>
+              <a:rPr lang="ko-KR" altLang="en-US" sz="1400" dirty="0" err="1"/>
+              <a:t>리디렉션</a:t>
+            </a:r>
+            <a:r>
+              <a:rPr lang="ko-KR" altLang="en-US" sz="1400" dirty="0"/>
+              <a:t> 진행</a:t>
+            </a:r>
+            <a:r>
+              <a:rPr lang="en-US" altLang="ko-KR" sz="1400" dirty="0"/>
+              <a:t>.</a:t>
+            </a:r>
+          </a:p>
+        </p:txBody>
+      </p:sp>
       <p:grpSp>
         <p:nvGrpSpPr>
-          <p:cNvPr id="19" name="그룹 18">
+          <p:cNvPr id="11" name="그룹 10">
             <a:extLst>
               <a:ext uri="{FF2B5EF4-FFF2-40B4-BE49-F238E27FC236}">
-                <a16:creationId xmlns:a16="http://schemas.microsoft.com/office/drawing/2014/main" id="{CA39C94B-4AE9-4F46-9651-14EF903FAED4}"/>
+                <a16:creationId xmlns:a16="http://schemas.microsoft.com/office/drawing/2014/main" id="{3E649E5F-091C-FCE8-5053-E2EEF787CB41}"/>
               </a:ext>
             </a:extLst>
           </p:cNvPr>
@@ -15275,7 +15419,7 @@
           <a:xfrm>
             <a:off x="631327" y="3108952"/>
             <a:ext cx="5909315" cy="3143496"/>
-            <a:chOff x="902678" y="3108952"/>
+            <a:chOff x="631327" y="3108952"/>
             <a:chExt cx="5909315" cy="3143496"/>
           </a:xfrm>
         </p:grpSpPr>
@@ -15293,7 +15437,7 @@
           </p:nvGrpSpPr>
           <p:grpSpPr>
             <a:xfrm>
-              <a:off x="902678" y="3108952"/>
+              <a:off x="631327" y="3108952"/>
               <a:ext cx="3546774" cy="3143496"/>
               <a:chOff x="902678" y="3212854"/>
               <a:chExt cx="3546774" cy="3143496"/>
@@ -15419,7 +15563,7 @@
           </p:nvSpPr>
           <p:spPr>
             <a:xfrm>
-              <a:off x="1053507" y="4015787"/>
+              <a:off x="782156" y="4733397"/>
               <a:ext cx="3245116" cy="369332"/>
             </a:xfrm>
             <a:prstGeom prst="rect">
@@ -15499,7 +15643,7 @@
           </p:nvSpPr>
           <p:spPr>
             <a:xfrm>
-              <a:off x="1053507" y="4680700"/>
+              <a:off x="782156" y="3938935"/>
               <a:ext cx="3245116" cy="369332"/>
             </a:xfrm>
             <a:prstGeom prst="rect">
@@ -15587,7 +15731,7 @@
           </p:blipFill>
           <p:spPr>
             <a:xfrm>
-              <a:off x="5862143" y="4544854"/>
+              <a:off x="5590792" y="3803089"/>
               <a:ext cx="641023" cy="641023"/>
             </a:xfrm>
             <a:prstGeom prst="rect">
@@ -15609,7 +15753,7 @@
           </p:nvSpPr>
           <p:spPr>
             <a:xfrm>
-              <a:off x="5553315" y="5336663"/>
+              <a:off x="5281964" y="4594898"/>
               <a:ext cx="1258678" cy="276999"/>
             </a:xfrm>
             <a:prstGeom prst="rect">
@@ -15662,7 +15806,7 @@
           </p:nvCxnSpPr>
           <p:spPr>
             <a:xfrm>
-              <a:off x="4298623" y="4865366"/>
+              <a:off x="4027272" y="4123601"/>
               <a:ext cx="1563520" cy="0"/>
             </a:xfrm>
             <a:prstGeom prst="straightConnector1">
@@ -15705,7 +15849,7 @@
           </p:nvSpPr>
           <p:spPr>
             <a:xfrm>
-              <a:off x="4719050" y="4557588"/>
+              <a:off x="4447699" y="3815823"/>
               <a:ext cx="752129" cy="307777"/>
             </a:xfrm>
             <a:prstGeom prst="rect">
@@ -15732,148 +15876,67 @@
             </a:p>
           </p:txBody>
         </p:sp>
+        <p:sp>
+          <p:nvSpPr>
+            <p:cNvPr id="3" name="TextBox 2">
+              <a:extLst>
+                <a:ext uri="{FF2B5EF4-FFF2-40B4-BE49-F238E27FC236}">
+                  <a16:creationId xmlns:a16="http://schemas.microsoft.com/office/drawing/2014/main" id="{882AC82A-75C7-7FE8-3A1A-14F5914172FC}"/>
+                </a:ext>
+              </a:extLst>
+            </p:cNvPr>
+            <p:cNvSpPr txBox="1"/>
+            <p:nvPr/>
+          </p:nvSpPr>
+          <p:spPr>
+            <a:xfrm>
+              <a:off x="782156" y="5527859"/>
+              <a:ext cx="3245116" cy="369332"/>
+            </a:xfrm>
+            <a:prstGeom prst="rect">
+              <a:avLst/>
+            </a:prstGeom>
+            <a:solidFill>
+              <a:schemeClr val="tx1"/>
+            </a:solidFill>
+          </p:spPr>
+          <p:txBody>
+            <a:bodyPr wrap="square" rtlCol="0">
+              <a:spAutoFit/>
+            </a:bodyPr>
+            <a:lstStyle/>
+            <a:p>
+              <a:pPr algn="ctr"/>
+              <a:r>
+                <a:rPr lang="en-US" altLang="ko-KR" sz="1600" dirty="0">
+                  <a:solidFill>
+                    <a:schemeClr val="bg1"/>
+                  </a:solidFill>
+                  <a:latin typeface="Roboto" panose="02000000000000000000" pitchFamily="2" charset="0"/>
+                  <a:ea typeface="Roboto" panose="02000000000000000000" pitchFamily="2" charset="0"/>
+                </a:rPr>
+                <a:t>Transport </a:t>
+              </a:r>
+              <a:r>
+                <a:rPr lang="en-US" altLang="ko-KR" dirty="0">
+                  <a:solidFill>
+                    <a:schemeClr val="bg1"/>
+                  </a:solidFill>
+                  <a:latin typeface="Roboto" panose="02000000000000000000" pitchFamily="2" charset="0"/>
+                  <a:ea typeface="Roboto" panose="02000000000000000000" pitchFamily="2" charset="0"/>
+                </a:rPr>
+                <a:t>layer</a:t>
+              </a:r>
+              <a:endParaRPr lang="ko-KR" altLang="en-US" dirty="0">
+                <a:solidFill>
+                  <a:schemeClr val="bg1"/>
+                </a:solidFill>
+                <a:latin typeface="Roboto" panose="02000000000000000000" pitchFamily="2" charset="0"/>
+              </a:endParaRPr>
+            </a:p>
+          </p:txBody>
+        </p:sp>
       </p:grpSp>
-      <p:sp>
-        <p:nvSpPr>
-          <p:cNvPr id="18" name="TextBox 17">
-            <a:extLst>
-              <a:ext uri="{FF2B5EF4-FFF2-40B4-BE49-F238E27FC236}">
-                <a16:creationId xmlns:a16="http://schemas.microsoft.com/office/drawing/2014/main" id="{2162534D-1E2A-49CE-BFBD-06634162076E}"/>
-              </a:ext>
-            </a:extLst>
-          </p:cNvPr>
-          <p:cNvSpPr txBox="1"/>
-          <p:nvPr/>
-        </p:nvSpPr>
-        <p:spPr>
-          <a:xfrm>
-            <a:off x="7096526" y="3429000"/>
-            <a:ext cx="4647027" cy="1815882"/>
-          </a:xfrm>
-          <a:prstGeom prst="rect">
-            <a:avLst/>
-          </a:prstGeom>
-          <a:noFill/>
-        </p:spPr>
-        <p:txBody>
-          <a:bodyPr wrap="square" rtlCol="0">
-            <a:spAutoFit/>
-          </a:bodyPr>
-          <a:lstStyle/>
-          <a:p>
-            <a:r>
-              <a:rPr lang="en-US" altLang="ko-KR" sz="1400" b="1">
-                <a:latin typeface="Roboto" panose="02000000000000000000" pitchFamily="2" charset="0"/>
-                <a:ea typeface="Roboto" panose="02000000000000000000" pitchFamily="2" charset="0"/>
-              </a:rPr>
-              <a:t>Redirect Server </a:t>
-            </a:r>
-            <a:r>
-              <a:rPr lang="ko-KR" altLang="en-US" sz="1400" b="1"/>
-              <a:t>특징</a:t>
-            </a:r>
-            <a:r>
-              <a:rPr lang="en-US" altLang="ko-KR" sz="1400"/>
-              <a:t>:</a:t>
-            </a:r>
-          </a:p>
-          <a:p>
-            <a:endParaRPr lang="en-US" altLang="ko-KR" sz="1400"/>
-          </a:p>
-          <a:p>
-            <a:pPr marL="285750" indent="-285750">
-              <a:buFont typeface="Arial" panose="020B0604020202020204" pitchFamily="34" charset="0"/>
-              <a:buChar char="•"/>
-            </a:pPr>
-            <a:r>
-              <a:rPr lang="ko-KR" altLang="en-US" sz="1400"/>
-              <a:t>자체적으로 </a:t>
-            </a:r>
-            <a:r>
-              <a:rPr lang="en-US" altLang="ko-KR" sz="1400"/>
-              <a:t>SIP </a:t>
-            </a:r>
-            <a:r>
-              <a:rPr lang="ko-KR" altLang="en-US" sz="1400"/>
-              <a:t>요청을 발행하지 않음</a:t>
-            </a:r>
-            <a:r>
-              <a:rPr lang="en-US" altLang="ko-KR" sz="1400"/>
-              <a:t>.</a:t>
-            </a:r>
-          </a:p>
-          <a:p>
-            <a:pPr marL="285750" indent="-285750">
-              <a:buFont typeface="Arial" panose="020B0604020202020204" pitchFamily="34" charset="0"/>
-              <a:buChar char="•"/>
-            </a:pPr>
-            <a:endParaRPr lang="en-US" altLang="ko-KR" sz="1400"/>
-          </a:p>
-          <a:p>
-            <a:pPr marL="285750" indent="-285750">
-              <a:buFont typeface="Arial" panose="020B0604020202020204" pitchFamily="34" charset="0"/>
-              <a:buChar char="•"/>
-            </a:pPr>
-            <a:r>
-              <a:rPr lang="en-US" altLang="ko-KR" sz="1400"/>
-              <a:t>CANCEL </a:t>
-            </a:r>
-            <a:r>
-              <a:rPr lang="ko-KR" altLang="en-US" sz="1400"/>
-              <a:t>이외의 요청을 수신한 후 거부하거나 </a:t>
-            </a:r>
-            <a:r>
-              <a:rPr lang="en-US" altLang="ko-KR" sz="1400"/>
-              <a:t>location service</a:t>
-            </a:r>
-            <a:r>
-              <a:rPr lang="ko-KR" altLang="en-US" sz="1400"/>
-              <a:t>로 부터 데이터를 수집하여 </a:t>
-            </a:r>
-            <a:r>
-              <a:rPr lang="en-US" altLang="ko-KR" sz="1400"/>
-              <a:t>3xx</a:t>
-            </a:r>
-            <a:r>
-              <a:rPr lang="ko-KR" altLang="en-US" sz="1400"/>
-              <a:t> 최종 응답을 반환</a:t>
-            </a:r>
-            <a:r>
-              <a:rPr lang="en-US" altLang="ko-KR" sz="1400"/>
-              <a:t>.</a:t>
-            </a:r>
-          </a:p>
-          <a:p>
-            <a:pPr marL="285750" indent="-285750">
-              <a:buFont typeface="Arial" panose="020B0604020202020204" pitchFamily="34" charset="0"/>
-              <a:buChar char="•"/>
-            </a:pPr>
-            <a:endParaRPr lang="en-US" altLang="ko-KR" sz="1400"/>
-          </a:p>
-          <a:p>
-            <a:pPr marL="285750" indent="-285750">
-              <a:buFont typeface="Arial" panose="020B0604020202020204" pitchFamily="34" charset="0"/>
-              <a:buChar char="•"/>
-            </a:pPr>
-            <a:r>
-              <a:rPr lang="ko-KR" altLang="en-US" sz="1400"/>
-              <a:t>인식할 수 없는 헤더 필드는 무시하고 해당 </a:t>
-            </a:r>
-            <a:r>
-              <a:rPr lang="ko-KR" altLang="en-US" sz="1400" err="1"/>
-              <a:t>리디렉션</a:t>
-            </a:r>
-            <a:r>
-              <a:rPr lang="ko-KR" altLang="en-US" sz="1400"/>
-              <a:t> 진행</a:t>
-            </a:r>
-            <a:r>
-              <a:rPr lang="en-US" altLang="ko-KR" sz="1400"/>
-              <a:t>.</a:t>
-            </a:r>
-          </a:p>
-        </p:txBody>
-      </p:sp>
     </p:spTree>
     <p:extLst>
       <p:ext uri="{BB962C8B-B14F-4D97-AF65-F5344CB8AC3E}">
@@ -20843,7 +20906,7 @@
           <a:p>
             <a:r>
               <a:rPr lang="en-US" altLang="ko-KR" dirty="0"/>
-              <a:t>7. Terminating a Session</a:t>
+              <a:t>7. Terminating a Session – Overview</a:t>
             </a:r>
             <a:endParaRPr lang="ko-KR" altLang="en-US" dirty="0"/>
           </a:p>
@@ -20878,10 +20941,1181 @@
           </a:p>
         </p:txBody>
       </p:sp>
+      <p:sp>
+        <p:nvSpPr>
+          <p:cNvPr id="3" name="직사각형 2">
+            <a:extLst>
+              <a:ext uri="{FF2B5EF4-FFF2-40B4-BE49-F238E27FC236}">
+                <a16:creationId xmlns:a16="http://schemas.microsoft.com/office/drawing/2014/main" id="{937B69BB-790A-FA9D-BB70-4FB7D8C70E52}"/>
+              </a:ext>
+            </a:extLst>
+          </p:cNvPr>
+          <p:cNvSpPr/>
+          <p:nvPr/>
+        </p:nvSpPr>
+        <p:spPr>
+          <a:xfrm>
+            <a:off x="522222" y="1068409"/>
+            <a:ext cx="11147556" cy="4768806"/>
+          </a:xfrm>
+          <a:prstGeom prst="rect">
+            <a:avLst/>
+          </a:prstGeom>
+        </p:spPr>
+        <p:txBody>
+          <a:bodyPr wrap="square">
+            <a:spAutoFit/>
+          </a:bodyPr>
+          <a:lstStyle/>
+          <a:p>
+            <a:pPr marL="285750" indent="-285750">
+              <a:lnSpc>
+                <a:spcPct val="200000"/>
+              </a:lnSpc>
+              <a:buFont typeface="Arial" panose="020B0604020202020204" pitchFamily="34" charset="0"/>
+              <a:buChar char="•"/>
+            </a:pPr>
+            <a:r>
+              <a:rPr lang="ko-KR" altLang="en-US" sz="1400" dirty="0">
+                <a:latin typeface="Roboto" panose="02000000000000000000" pitchFamily="2" charset="0"/>
+              </a:rPr>
+              <a:t>세션의 상태와 다이얼로그의 상태는 아주 밀접히 관련됨</a:t>
+            </a:r>
+            <a:endParaRPr lang="en-US" altLang="ko-KR" sz="1400" dirty="0">
+              <a:latin typeface="Roboto" panose="02000000000000000000" pitchFamily="2" charset="0"/>
+            </a:endParaRPr>
+          </a:p>
+          <a:p>
+            <a:pPr marL="285750" indent="-285750">
+              <a:lnSpc>
+                <a:spcPct val="200000"/>
+              </a:lnSpc>
+              <a:buFont typeface="Arial" panose="020B0604020202020204" pitchFamily="34" charset="0"/>
+              <a:buChar char="•"/>
+            </a:pPr>
+            <a:r>
+              <a:rPr lang="ko-KR" altLang="en-US" sz="1400" dirty="0">
+                <a:latin typeface="Roboto" panose="02000000000000000000" pitchFamily="2" charset="0"/>
+              </a:rPr>
+              <a:t>세션이 </a:t>
+            </a:r>
+            <a:r>
+              <a:rPr lang="en-US" altLang="ko-KR" sz="1400" b="1" dirty="0">
+                <a:latin typeface="Roboto" panose="02000000000000000000" pitchFamily="2" charset="0"/>
+              </a:rPr>
+              <a:t>INVITE</a:t>
+            </a:r>
+            <a:r>
+              <a:rPr lang="ko-KR" altLang="en-US" sz="1400" dirty="0">
+                <a:latin typeface="Roboto" panose="02000000000000000000" pitchFamily="2" charset="0"/>
+              </a:rPr>
+              <a:t>로 시작하면</a:t>
+            </a:r>
+            <a:r>
+              <a:rPr lang="en-US" altLang="ko-KR" sz="1400" dirty="0">
+                <a:latin typeface="Roboto" panose="02000000000000000000" pitchFamily="2" charset="0"/>
+              </a:rPr>
+              <a:t>, UAS</a:t>
+            </a:r>
+            <a:r>
+              <a:rPr lang="ko-KR" altLang="en-US" sz="1400" dirty="0">
+                <a:latin typeface="Roboto" panose="02000000000000000000" pitchFamily="2" charset="0"/>
+              </a:rPr>
+              <a:t>로 부터 </a:t>
+            </a:r>
+            <a:r>
+              <a:rPr lang="en-US" altLang="ko-KR" sz="1400" b="1" dirty="0">
+                <a:latin typeface="Roboto" panose="02000000000000000000" pitchFamily="2" charset="0"/>
+              </a:rPr>
+              <a:t>1xx</a:t>
+            </a:r>
+            <a:r>
+              <a:rPr lang="ko-KR" altLang="en-US" sz="1400" dirty="0">
+                <a:latin typeface="Roboto" panose="02000000000000000000" pitchFamily="2" charset="0"/>
+              </a:rPr>
+              <a:t> 또는 </a:t>
+            </a:r>
+            <a:r>
+              <a:rPr lang="en-US" altLang="ko-KR" sz="1400" b="1" dirty="0">
+                <a:latin typeface="Roboto" panose="02000000000000000000" pitchFamily="2" charset="0"/>
+              </a:rPr>
+              <a:t>2xx</a:t>
+            </a:r>
+            <a:r>
+              <a:rPr lang="en-US" altLang="ko-KR" sz="1400" dirty="0">
+                <a:latin typeface="Roboto" panose="02000000000000000000" pitchFamily="2" charset="0"/>
+              </a:rPr>
+              <a:t> </a:t>
+            </a:r>
+            <a:r>
+              <a:rPr lang="ko-KR" altLang="en-US" sz="1400" dirty="0">
+                <a:latin typeface="Roboto" panose="02000000000000000000" pitchFamily="2" charset="0"/>
+              </a:rPr>
+              <a:t>응답은 </a:t>
+            </a:r>
+            <a:r>
+              <a:rPr lang="ko-KR" altLang="en-US" sz="1400" b="1" dirty="0">
+                <a:latin typeface="Roboto" panose="02000000000000000000" pitchFamily="2" charset="0"/>
+              </a:rPr>
+              <a:t>다이얼로그를 생성</a:t>
+            </a:r>
+            <a:r>
+              <a:rPr lang="ko-KR" altLang="en-US" sz="1400" dirty="0">
+                <a:latin typeface="Roboto" panose="02000000000000000000" pitchFamily="2" charset="0"/>
+              </a:rPr>
+              <a:t>하고</a:t>
+            </a:r>
+            <a:r>
+              <a:rPr lang="en-US" altLang="ko-KR" sz="1400" dirty="0">
+                <a:latin typeface="Roboto" panose="02000000000000000000" pitchFamily="2" charset="0"/>
+              </a:rPr>
+              <a:t>, </a:t>
+            </a:r>
+            <a:r>
+              <a:rPr lang="ko-KR" altLang="en-US" sz="1400" dirty="0">
+                <a:latin typeface="Roboto" panose="02000000000000000000" pitchFamily="2" charset="0"/>
+              </a:rPr>
+              <a:t>그 응답에서 </a:t>
+            </a:r>
+            <a:r>
+              <a:rPr lang="en-US" altLang="ko-KR" sz="1400" b="1" dirty="0">
+                <a:latin typeface="Roboto" panose="02000000000000000000" pitchFamily="2" charset="0"/>
+              </a:rPr>
+              <a:t>offer/answer </a:t>
+            </a:r>
+            <a:r>
+              <a:rPr lang="ko-KR" altLang="en-US" sz="1400" dirty="0">
+                <a:latin typeface="Roboto" panose="02000000000000000000" pitchFamily="2" charset="0"/>
+              </a:rPr>
+              <a:t>교환을 완료하면 </a:t>
+            </a:r>
+            <a:r>
+              <a:rPr lang="ko-KR" altLang="en-US" sz="1400" b="1" dirty="0">
+                <a:latin typeface="Roboto" panose="02000000000000000000" pitchFamily="2" charset="0"/>
+              </a:rPr>
+              <a:t>세션이 생성됨</a:t>
+            </a:r>
+            <a:endParaRPr lang="en-US" altLang="ko-KR" sz="1400" b="1" dirty="0">
+              <a:latin typeface="Roboto" panose="02000000000000000000" pitchFamily="2" charset="0"/>
+            </a:endParaRPr>
+          </a:p>
+          <a:p>
+            <a:pPr marL="285750" indent="-285750">
+              <a:lnSpc>
+                <a:spcPct val="200000"/>
+              </a:lnSpc>
+              <a:buFont typeface="Arial" panose="020B0604020202020204" pitchFamily="34" charset="0"/>
+              <a:buChar char="•"/>
+            </a:pPr>
+            <a:r>
+              <a:rPr lang="ko-KR" altLang="en-US" sz="1400" b="1" dirty="0">
+                <a:latin typeface="Roboto" panose="02000000000000000000" pitchFamily="2" charset="0"/>
+              </a:rPr>
+              <a:t>결과적으로</a:t>
+            </a:r>
+            <a:r>
+              <a:rPr lang="en-US" altLang="ko-KR" sz="1400" b="1" dirty="0">
+                <a:latin typeface="Roboto" panose="02000000000000000000" pitchFamily="2" charset="0"/>
+              </a:rPr>
+              <a:t>, </a:t>
+            </a:r>
+            <a:r>
+              <a:rPr lang="ko-KR" altLang="en-US" sz="1400" b="1" dirty="0">
+                <a:latin typeface="Roboto" panose="02000000000000000000" pitchFamily="2" charset="0"/>
+              </a:rPr>
+              <a:t>각 세션은 단일 다이얼로그와 연관됨</a:t>
+            </a:r>
+            <a:endParaRPr lang="en-US" altLang="ko-KR" sz="1400" b="1" dirty="0">
+              <a:latin typeface="Roboto" panose="02000000000000000000" pitchFamily="2" charset="0"/>
+            </a:endParaRPr>
+          </a:p>
+          <a:p>
+            <a:pPr marL="285750" indent="-285750">
+              <a:lnSpc>
+                <a:spcPct val="200000"/>
+              </a:lnSpc>
+              <a:buFont typeface="Arial" panose="020B0604020202020204" pitchFamily="34" charset="0"/>
+              <a:buChar char="•"/>
+            </a:pPr>
+            <a:r>
+              <a:rPr lang="en-US" altLang="ko-KR" sz="1400" b="1" dirty="0">
+                <a:latin typeface="Roboto" panose="02000000000000000000" pitchFamily="2" charset="0"/>
+              </a:rPr>
+              <a:t>Initial</a:t>
+            </a:r>
+            <a:r>
+              <a:rPr lang="ko-KR" altLang="en-US" sz="1400" dirty="0">
+                <a:latin typeface="Roboto" panose="02000000000000000000" pitchFamily="2" charset="0"/>
+              </a:rPr>
+              <a:t> </a:t>
+            </a:r>
+            <a:r>
+              <a:rPr lang="en-US" altLang="ko-KR" sz="1400" b="1" dirty="0">
+                <a:latin typeface="Roboto" panose="02000000000000000000" pitchFamily="2" charset="0"/>
+              </a:rPr>
+              <a:t>INVITE</a:t>
+            </a:r>
+            <a:r>
+              <a:rPr lang="ko-KR" altLang="en-US" sz="1400" dirty="0">
+                <a:latin typeface="Roboto" panose="02000000000000000000" pitchFamily="2" charset="0"/>
+              </a:rPr>
+              <a:t>가 </a:t>
+            </a:r>
+            <a:r>
+              <a:rPr lang="en-US" altLang="ko-KR" sz="1400" b="1" dirty="0">
+                <a:latin typeface="Roboto" panose="02000000000000000000" pitchFamily="2" charset="0"/>
+              </a:rPr>
+              <a:t>non-2xx final </a:t>
+            </a:r>
+            <a:r>
+              <a:rPr lang="ko-KR" altLang="en-US" sz="1400" b="1" dirty="0">
+                <a:latin typeface="Roboto" panose="02000000000000000000" pitchFamily="2" charset="0"/>
+              </a:rPr>
+              <a:t>응답</a:t>
+            </a:r>
+            <a:r>
+              <a:rPr lang="ko-KR" altLang="en-US" sz="1400" dirty="0">
+                <a:latin typeface="Roboto" panose="02000000000000000000" pitchFamily="2" charset="0"/>
+              </a:rPr>
+              <a:t>을 생성하면 요청에 대한 응답을 통해 생성된 모든 세션</a:t>
+            </a:r>
+            <a:r>
+              <a:rPr lang="en-US" altLang="ko-KR" sz="1400" dirty="0">
+                <a:latin typeface="Roboto" panose="02000000000000000000" pitchFamily="2" charset="0"/>
+              </a:rPr>
+              <a:t>(</a:t>
+            </a:r>
+            <a:r>
+              <a:rPr lang="ko-KR" altLang="en-US" sz="1400" dirty="0">
+                <a:latin typeface="Roboto" panose="02000000000000000000" pitchFamily="2" charset="0"/>
+              </a:rPr>
+              <a:t>있는 경우</a:t>
+            </a:r>
+            <a:r>
+              <a:rPr lang="en-US" altLang="ko-KR" sz="1400" dirty="0">
+                <a:latin typeface="Roboto" panose="02000000000000000000" pitchFamily="2" charset="0"/>
+              </a:rPr>
+              <a:t>)</a:t>
+            </a:r>
+            <a:r>
+              <a:rPr lang="ko-KR" altLang="en-US" sz="1400" dirty="0">
+                <a:latin typeface="Roboto" panose="02000000000000000000" pitchFamily="2" charset="0"/>
+              </a:rPr>
+              <a:t>과 모든 다이얼로그</a:t>
+            </a:r>
+            <a:r>
+              <a:rPr lang="en-US" altLang="ko-KR" sz="1400" dirty="0">
+                <a:latin typeface="Roboto" panose="02000000000000000000" pitchFamily="2" charset="0"/>
+              </a:rPr>
+              <a:t>(</a:t>
+            </a:r>
+            <a:r>
+              <a:rPr lang="ko-KR" altLang="en-US" sz="1400" dirty="0">
+                <a:latin typeface="Roboto" panose="02000000000000000000" pitchFamily="2" charset="0"/>
+              </a:rPr>
+              <a:t>있는 경우</a:t>
+            </a:r>
+            <a:r>
+              <a:rPr lang="en-US" altLang="ko-KR" sz="1400" dirty="0">
+                <a:latin typeface="Roboto" panose="02000000000000000000" pitchFamily="2" charset="0"/>
+              </a:rPr>
+              <a:t>)</a:t>
+            </a:r>
+            <a:r>
+              <a:rPr lang="ko-KR" altLang="en-US" sz="1400" dirty="0">
+                <a:latin typeface="Roboto" panose="02000000000000000000" pitchFamily="2" charset="0"/>
+              </a:rPr>
+              <a:t>가 종료됨</a:t>
+            </a:r>
+            <a:endParaRPr lang="en-US" altLang="ko-KR" sz="1400" dirty="0">
+              <a:latin typeface="Roboto" panose="02000000000000000000" pitchFamily="2" charset="0"/>
+            </a:endParaRPr>
+          </a:p>
+          <a:p>
+            <a:pPr marL="285750" indent="-285750">
+              <a:lnSpc>
+                <a:spcPct val="200000"/>
+              </a:lnSpc>
+              <a:buFont typeface="Arial" panose="020B0604020202020204" pitchFamily="34" charset="0"/>
+              <a:buChar char="•"/>
+            </a:pPr>
+            <a:r>
+              <a:rPr lang="ko-KR" altLang="en-US" sz="1400" dirty="0">
+                <a:latin typeface="Roboto" panose="02000000000000000000" pitchFamily="2" charset="0"/>
+              </a:rPr>
+              <a:t>트랜잭션이 완료되면 </a:t>
+            </a:r>
+            <a:r>
+              <a:rPr lang="en-US" altLang="ko-KR" sz="1400" b="1" dirty="0">
+                <a:latin typeface="Roboto" panose="02000000000000000000" pitchFamily="2" charset="0"/>
+              </a:rPr>
+              <a:t>non-2xx final </a:t>
+            </a:r>
+            <a:r>
+              <a:rPr lang="ko-KR" altLang="en-US" sz="1400" b="1" dirty="0">
+                <a:latin typeface="Roboto" panose="02000000000000000000" pitchFamily="2" charset="0"/>
+              </a:rPr>
+              <a:t>응답은 </a:t>
+            </a:r>
+            <a:r>
+              <a:rPr lang="en-US" altLang="ko-KR" sz="1400" dirty="0">
+                <a:latin typeface="Roboto" panose="02000000000000000000" pitchFamily="2" charset="0"/>
+              </a:rPr>
+              <a:t>INVITE </a:t>
+            </a:r>
+            <a:r>
+              <a:rPr lang="ko-KR" altLang="en-US" sz="1400" dirty="0">
+                <a:latin typeface="Roboto" panose="02000000000000000000" pitchFamily="2" charset="0"/>
+              </a:rPr>
+              <a:t>의 결과로 추가 세션이 생성되는 것을 방지</a:t>
+            </a:r>
+            <a:endParaRPr lang="en-US" altLang="ko-KR" sz="1400" dirty="0">
+              <a:latin typeface="Roboto" panose="02000000000000000000" pitchFamily="2" charset="0"/>
+            </a:endParaRPr>
+          </a:p>
+          <a:p>
+            <a:pPr marL="285750" indent="-285750">
+              <a:lnSpc>
+                <a:spcPct val="200000"/>
+              </a:lnSpc>
+              <a:buFont typeface="Arial" panose="020B0604020202020204" pitchFamily="34" charset="0"/>
+              <a:buChar char="•"/>
+            </a:pPr>
+            <a:r>
+              <a:rPr lang="en-US" altLang="ko-KR" sz="1400" b="1" dirty="0">
+                <a:latin typeface="Roboto" panose="02000000000000000000" pitchFamily="2" charset="0"/>
+              </a:rPr>
+              <a:t>BYE</a:t>
+            </a:r>
+            <a:r>
+              <a:rPr lang="ko-KR" altLang="en-US" sz="1400" b="1" dirty="0">
+                <a:latin typeface="Roboto" panose="02000000000000000000" pitchFamily="2" charset="0"/>
+              </a:rPr>
+              <a:t> </a:t>
+            </a:r>
+            <a:r>
+              <a:rPr lang="ko-KR" altLang="en-US" sz="1400" dirty="0">
+                <a:latin typeface="Roboto" panose="02000000000000000000" pitchFamily="2" charset="0"/>
+              </a:rPr>
+              <a:t>요청은 특정 세션</a:t>
+            </a:r>
+            <a:r>
+              <a:rPr lang="en-US" altLang="ko-KR" sz="1400" dirty="0">
+                <a:latin typeface="Roboto" panose="02000000000000000000" pitchFamily="2" charset="0"/>
+              </a:rPr>
+              <a:t>(</a:t>
+            </a:r>
+            <a:r>
+              <a:rPr lang="ko-KR" altLang="en-US" sz="1400" dirty="0">
+                <a:latin typeface="Roboto" panose="02000000000000000000" pitchFamily="2" charset="0"/>
+              </a:rPr>
+              <a:t>상대측</a:t>
+            </a:r>
+            <a:r>
+              <a:rPr lang="en-US" altLang="ko-KR" sz="1400" dirty="0">
+                <a:latin typeface="Roboto" panose="02000000000000000000" pitchFamily="2" charset="0"/>
+              </a:rPr>
+              <a:t>)</a:t>
+            </a:r>
+            <a:r>
+              <a:rPr lang="ko-KR" altLang="en-US" sz="1400" dirty="0">
+                <a:latin typeface="Roboto" panose="02000000000000000000" pitchFamily="2" charset="0"/>
+              </a:rPr>
+              <a:t> 또는 시도된 세션을 종료하는 데 사용</a:t>
+            </a:r>
+            <a:endParaRPr lang="en-US" altLang="ko-KR" sz="1400" dirty="0">
+              <a:latin typeface="Roboto" panose="02000000000000000000" pitchFamily="2" charset="0"/>
+            </a:endParaRPr>
+          </a:p>
+          <a:p>
+            <a:pPr marL="285750" indent="-285750">
+              <a:lnSpc>
+                <a:spcPct val="200000"/>
+              </a:lnSpc>
+              <a:buFont typeface="Arial" panose="020B0604020202020204" pitchFamily="34" charset="0"/>
+              <a:buChar char="•"/>
+            </a:pPr>
+            <a:r>
+              <a:rPr lang="ko-KR" altLang="en-US" sz="1400" dirty="0">
+                <a:latin typeface="Roboto" panose="02000000000000000000" pitchFamily="2" charset="0"/>
+              </a:rPr>
+              <a:t>다이얼로그에서 </a:t>
+            </a:r>
+            <a:r>
+              <a:rPr lang="en-US" altLang="ko-KR" sz="1400" b="1" dirty="0">
+                <a:latin typeface="Roboto" panose="02000000000000000000" pitchFamily="2" charset="0"/>
+              </a:rPr>
+              <a:t>BYE</a:t>
+            </a:r>
+            <a:r>
+              <a:rPr lang="en-US" altLang="ko-KR" sz="1400" dirty="0">
+                <a:latin typeface="Roboto" panose="02000000000000000000" pitchFamily="2" charset="0"/>
+              </a:rPr>
+              <a:t> </a:t>
+            </a:r>
+            <a:r>
+              <a:rPr lang="ko-KR" altLang="en-US" sz="1400" dirty="0">
+                <a:latin typeface="Roboto" panose="02000000000000000000" pitchFamily="2" charset="0"/>
+              </a:rPr>
+              <a:t>가 수신되면 해당 다이얼로그와 관련된 모든 세션이 종료되어야 함</a:t>
+            </a:r>
+            <a:endParaRPr lang="en-US" altLang="ko-KR" sz="1400" dirty="0">
+              <a:latin typeface="Roboto" panose="02000000000000000000" pitchFamily="2" charset="0"/>
+            </a:endParaRPr>
+          </a:p>
+          <a:p>
+            <a:pPr marL="285750" indent="-285750">
+              <a:lnSpc>
+                <a:spcPct val="200000"/>
+              </a:lnSpc>
+              <a:buFont typeface="Arial" panose="020B0604020202020204" pitchFamily="34" charset="0"/>
+              <a:buChar char="•"/>
+            </a:pPr>
+            <a:r>
+              <a:rPr lang="en-US" altLang="ko-KR" sz="1400" dirty="0">
+                <a:latin typeface="Roboto" panose="02000000000000000000" pitchFamily="2" charset="0"/>
+              </a:rPr>
+              <a:t>UA</a:t>
+            </a:r>
+            <a:r>
+              <a:rPr lang="ko-KR" altLang="en-US" sz="1400" dirty="0">
+                <a:latin typeface="Roboto" panose="02000000000000000000" pitchFamily="2" charset="0"/>
+              </a:rPr>
+              <a:t>는 다이얼로그 외부에서 </a:t>
+            </a:r>
+            <a:r>
+              <a:rPr lang="en-US" altLang="ko-KR" sz="1400" b="1" dirty="0">
+                <a:latin typeface="Roboto" panose="02000000000000000000" pitchFamily="2" charset="0"/>
+              </a:rPr>
+              <a:t>BYE</a:t>
+            </a:r>
+            <a:r>
+              <a:rPr lang="en-US" altLang="ko-KR" sz="1400" dirty="0">
+                <a:latin typeface="Roboto" panose="02000000000000000000" pitchFamily="2" charset="0"/>
+              </a:rPr>
+              <a:t> </a:t>
+            </a:r>
+            <a:r>
+              <a:rPr lang="ko-KR" altLang="en-US" sz="1400" dirty="0">
+                <a:latin typeface="Roboto" panose="02000000000000000000" pitchFamily="2" charset="0"/>
+              </a:rPr>
+              <a:t>를 보내면 안됨</a:t>
+            </a:r>
+            <a:endParaRPr lang="en-US" altLang="ko-KR" sz="1400" dirty="0">
+              <a:latin typeface="Roboto" panose="02000000000000000000" pitchFamily="2" charset="0"/>
+            </a:endParaRPr>
+          </a:p>
+          <a:p>
+            <a:pPr marL="285750" indent="-285750">
+              <a:lnSpc>
+                <a:spcPct val="200000"/>
+              </a:lnSpc>
+              <a:buFont typeface="Arial" panose="020B0604020202020204" pitchFamily="34" charset="0"/>
+              <a:buChar char="•"/>
+            </a:pPr>
+            <a:r>
+              <a:rPr lang="ko-KR" altLang="en-US" sz="1400" dirty="0">
+                <a:latin typeface="Roboto" panose="02000000000000000000" pitchFamily="2" charset="0"/>
+              </a:rPr>
+              <a:t>발신자의 </a:t>
+            </a:r>
+            <a:r>
+              <a:rPr lang="en-US" altLang="ko-KR" sz="1400" dirty="0">
+                <a:latin typeface="Roboto" panose="02000000000000000000" pitchFamily="2" charset="0"/>
+              </a:rPr>
+              <a:t>UA</a:t>
+            </a:r>
+            <a:r>
+              <a:rPr lang="ko-KR" altLang="en-US" sz="1400" dirty="0">
+                <a:latin typeface="Roboto" panose="02000000000000000000" pitchFamily="2" charset="0"/>
+              </a:rPr>
+              <a:t>는</a:t>
+            </a:r>
+            <a:r>
+              <a:rPr lang="en-US" altLang="ko-KR" sz="1400" dirty="0">
+                <a:latin typeface="Roboto" panose="02000000000000000000" pitchFamily="2" charset="0"/>
+              </a:rPr>
+              <a:t> </a:t>
+            </a:r>
+            <a:r>
+              <a:rPr lang="en-US" altLang="ko-KR" sz="1400" b="1" dirty="0">
+                <a:latin typeface="Roboto" panose="02000000000000000000" pitchFamily="2" charset="0"/>
+              </a:rPr>
+              <a:t>confirmed </a:t>
+            </a:r>
+            <a:r>
+              <a:rPr lang="ko-KR" altLang="en-US" sz="1400" dirty="0">
+                <a:latin typeface="Roboto" panose="02000000000000000000" pitchFamily="2" charset="0"/>
+              </a:rPr>
+              <a:t>상태 다이얼로그 또는 </a:t>
+            </a:r>
+            <a:r>
+              <a:rPr lang="en-US" altLang="ko-KR" sz="1400" b="1" dirty="0">
+                <a:latin typeface="Roboto" panose="02000000000000000000" pitchFamily="2" charset="0"/>
+              </a:rPr>
+              <a:t>early</a:t>
+            </a:r>
+            <a:r>
+              <a:rPr lang="en-US" altLang="ko-KR" sz="1400" dirty="0">
+                <a:latin typeface="Roboto" panose="02000000000000000000" pitchFamily="2" charset="0"/>
+              </a:rPr>
+              <a:t> </a:t>
+            </a:r>
+            <a:r>
+              <a:rPr lang="ko-KR" altLang="en-US" sz="1400" dirty="0">
+                <a:latin typeface="Roboto" panose="02000000000000000000" pitchFamily="2" charset="0"/>
+              </a:rPr>
+              <a:t>상태의 다이얼로그에 대해  </a:t>
+            </a:r>
+            <a:r>
+              <a:rPr lang="en-US" altLang="ko-KR" sz="1400" b="1" dirty="0">
+                <a:latin typeface="Roboto" panose="02000000000000000000" pitchFamily="2" charset="0"/>
+              </a:rPr>
+              <a:t>BYE</a:t>
+            </a:r>
+            <a:r>
+              <a:rPr lang="ko-KR" altLang="en-US" sz="1400" dirty="0">
+                <a:latin typeface="Roboto" panose="02000000000000000000" pitchFamily="2" charset="0"/>
+              </a:rPr>
+              <a:t>를 보낼 수 있으며</a:t>
+            </a:r>
+            <a:r>
+              <a:rPr lang="en-US" altLang="ko-KR" sz="1400" dirty="0">
+                <a:latin typeface="Roboto" panose="02000000000000000000" pitchFamily="2" charset="0"/>
+              </a:rPr>
+              <a:t>, </a:t>
+            </a:r>
+            <a:r>
+              <a:rPr lang="ko-KR" altLang="en-US" sz="1400" dirty="0">
+                <a:latin typeface="Roboto" panose="02000000000000000000" pitchFamily="2" charset="0"/>
+              </a:rPr>
+              <a:t>수신자의 </a:t>
+            </a:r>
+            <a:r>
+              <a:rPr lang="en-US" altLang="ko-KR" sz="1400" dirty="0">
+                <a:latin typeface="Roboto" panose="02000000000000000000" pitchFamily="2" charset="0"/>
+              </a:rPr>
+              <a:t>UA</a:t>
+            </a:r>
+            <a:r>
+              <a:rPr lang="ko-KR" altLang="en-US" sz="1400" dirty="0">
+                <a:latin typeface="Roboto" panose="02000000000000000000" pitchFamily="2" charset="0"/>
+              </a:rPr>
+              <a:t>는 </a:t>
+            </a:r>
+            <a:r>
+              <a:rPr lang="en-US" altLang="ko-KR" sz="1400" b="1" dirty="0">
+                <a:latin typeface="Roboto" panose="02000000000000000000" pitchFamily="2" charset="0"/>
+              </a:rPr>
+              <a:t>confirmed</a:t>
+            </a:r>
+            <a:r>
+              <a:rPr lang="en-US" altLang="ko-KR" sz="1400" dirty="0">
+                <a:latin typeface="Roboto" panose="02000000000000000000" pitchFamily="2" charset="0"/>
+              </a:rPr>
+              <a:t> </a:t>
+            </a:r>
+            <a:r>
+              <a:rPr lang="ko-KR" altLang="en-US" sz="1400" dirty="0">
+                <a:latin typeface="Roboto" panose="02000000000000000000" pitchFamily="2" charset="0"/>
+              </a:rPr>
+              <a:t>다이얼로그</a:t>
+            </a:r>
+            <a:br>
+              <a:rPr lang="en-US" altLang="ko-KR" sz="1400" dirty="0">
+                <a:latin typeface="Roboto" panose="02000000000000000000" pitchFamily="2" charset="0"/>
+              </a:rPr>
+            </a:br>
+            <a:r>
+              <a:rPr lang="ko-KR" altLang="en-US" sz="1400" dirty="0">
+                <a:latin typeface="Roboto" panose="02000000000000000000" pitchFamily="2" charset="0"/>
+              </a:rPr>
+              <a:t>에 대해 </a:t>
+            </a:r>
+            <a:r>
+              <a:rPr lang="en-US" altLang="ko-KR" sz="1400" b="1" dirty="0">
+                <a:latin typeface="Roboto" panose="02000000000000000000" pitchFamily="2" charset="0"/>
+              </a:rPr>
+              <a:t>BYE</a:t>
+            </a:r>
+            <a:r>
+              <a:rPr lang="ko-KR" altLang="en-US" sz="1400" dirty="0">
+                <a:latin typeface="Roboto" panose="02000000000000000000" pitchFamily="2" charset="0"/>
+              </a:rPr>
+              <a:t>를 보낼 수 있지만</a:t>
+            </a:r>
+            <a:r>
+              <a:rPr lang="en-US" altLang="ko-KR" sz="1400" dirty="0">
+                <a:latin typeface="Roboto" panose="02000000000000000000" pitchFamily="2" charset="0"/>
+              </a:rPr>
+              <a:t>, </a:t>
+            </a:r>
+            <a:r>
+              <a:rPr lang="en-US" altLang="ko-KR" sz="1400" b="1" dirty="0">
+                <a:latin typeface="Roboto" panose="02000000000000000000" pitchFamily="2" charset="0"/>
+              </a:rPr>
+              <a:t>early</a:t>
+            </a:r>
+            <a:r>
+              <a:rPr lang="en-US" altLang="ko-KR" sz="1400" dirty="0">
+                <a:latin typeface="Roboto" panose="02000000000000000000" pitchFamily="2" charset="0"/>
+              </a:rPr>
+              <a:t> </a:t>
+            </a:r>
+            <a:r>
+              <a:rPr lang="ko-KR" altLang="en-US" sz="1400" dirty="0">
+                <a:latin typeface="Roboto" panose="02000000000000000000" pitchFamily="2" charset="0"/>
+              </a:rPr>
+              <a:t>다이얼로그에는 </a:t>
+            </a:r>
+            <a:r>
+              <a:rPr lang="en-US" altLang="ko-KR" sz="1400" b="1" dirty="0">
+                <a:latin typeface="Roboto" panose="02000000000000000000" pitchFamily="2" charset="0"/>
+              </a:rPr>
+              <a:t>BYE</a:t>
+            </a:r>
+            <a:r>
+              <a:rPr lang="ko-KR" altLang="en-US" sz="1400" dirty="0">
+                <a:latin typeface="Roboto" panose="02000000000000000000" pitchFamily="2" charset="0"/>
+              </a:rPr>
+              <a:t>를 보낼 수 없음</a:t>
+            </a:r>
+            <a:endParaRPr lang="en-US" altLang="ko-KR" sz="1400" dirty="0">
+              <a:latin typeface="Roboto" panose="02000000000000000000" pitchFamily="2" charset="0"/>
+            </a:endParaRPr>
+          </a:p>
+          <a:p>
+            <a:pPr marL="285750" indent="-285750">
+              <a:lnSpc>
+                <a:spcPct val="200000"/>
+              </a:lnSpc>
+              <a:buFont typeface="Arial" panose="020B0604020202020204" pitchFamily="34" charset="0"/>
+              <a:buChar char="•"/>
+            </a:pPr>
+            <a:r>
+              <a:rPr lang="ko-KR" altLang="en-US" sz="1400" dirty="0">
+                <a:latin typeface="Roboto" panose="02000000000000000000" pitchFamily="2" charset="0"/>
+              </a:rPr>
+              <a:t>수신자의 </a:t>
+            </a:r>
+            <a:r>
+              <a:rPr lang="en-US" altLang="ko-KR" sz="1400" dirty="0">
+                <a:latin typeface="Roboto" panose="02000000000000000000" pitchFamily="2" charset="0"/>
+              </a:rPr>
+              <a:t>UA</a:t>
+            </a:r>
+            <a:r>
+              <a:rPr lang="ko-KR" altLang="en-US" sz="1400" dirty="0">
+                <a:latin typeface="Roboto" panose="02000000000000000000" pitchFamily="2" charset="0"/>
+              </a:rPr>
+              <a:t>는 </a:t>
+            </a:r>
+            <a:r>
+              <a:rPr lang="en-US" altLang="ko-KR" sz="1400" b="1" dirty="0">
+                <a:latin typeface="Roboto" panose="02000000000000000000" pitchFamily="2" charset="0"/>
+              </a:rPr>
+              <a:t>2xx</a:t>
+            </a:r>
+            <a:r>
+              <a:rPr lang="en-US" altLang="ko-KR" sz="1400" dirty="0">
+                <a:latin typeface="Roboto" panose="02000000000000000000" pitchFamily="2" charset="0"/>
+              </a:rPr>
+              <a:t> </a:t>
+            </a:r>
+            <a:r>
+              <a:rPr lang="ko-KR" altLang="en-US" sz="1400" dirty="0">
+                <a:latin typeface="Roboto" panose="02000000000000000000" pitchFamily="2" charset="0"/>
+              </a:rPr>
+              <a:t>응답에 대한 </a:t>
+            </a:r>
+            <a:r>
+              <a:rPr lang="en-US" altLang="ko-KR" sz="1400" b="1" dirty="0">
+                <a:latin typeface="Roboto" panose="02000000000000000000" pitchFamily="2" charset="0"/>
+              </a:rPr>
+              <a:t>ACK</a:t>
+            </a:r>
+            <a:r>
+              <a:rPr lang="ko-KR" altLang="en-US" sz="1400" dirty="0">
+                <a:latin typeface="Roboto" panose="02000000000000000000" pitchFamily="2" charset="0"/>
+              </a:rPr>
+              <a:t>를 수신하거나 서버 트랜잭션이 </a:t>
+            </a:r>
+            <a:r>
+              <a:rPr lang="en-US" altLang="ko-KR" sz="1400" b="1" dirty="0">
+                <a:latin typeface="Roboto" panose="02000000000000000000" pitchFamily="2" charset="0"/>
+              </a:rPr>
+              <a:t>timeout</a:t>
+            </a:r>
+            <a:r>
+              <a:rPr lang="ko-KR" altLang="en-US" sz="1400" dirty="0">
+                <a:latin typeface="Roboto" panose="02000000000000000000" pitchFamily="2" charset="0"/>
+              </a:rPr>
+              <a:t> 이 뜰때까지 </a:t>
+            </a:r>
+            <a:r>
+              <a:rPr lang="en-US" altLang="ko-KR" sz="1400" b="1" dirty="0">
+                <a:latin typeface="Roboto" panose="02000000000000000000" pitchFamily="2" charset="0"/>
+              </a:rPr>
+              <a:t>confirmed</a:t>
+            </a:r>
+            <a:r>
+              <a:rPr lang="en-US" altLang="ko-KR" sz="1400" dirty="0">
+                <a:latin typeface="Roboto" panose="02000000000000000000" pitchFamily="2" charset="0"/>
+              </a:rPr>
+              <a:t> </a:t>
+            </a:r>
+            <a:r>
+              <a:rPr lang="ko-KR" altLang="en-US" sz="1400" dirty="0">
+                <a:latin typeface="Roboto" panose="02000000000000000000" pitchFamily="2" charset="0"/>
+              </a:rPr>
+              <a:t>다이얼로그에서 </a:t>
+            </a:r>
+            <a:r>
+              <a:rPr lang="en-US" altLang="ko-KR" sz="1400" dirty="0">
+                <a:latin typeface="Roboto" panose="02000000000000000000" pitchFamily="2" charset="0"/>
+              </a:rPr>
+              <a:t>BYE</a:t>
+            </a:r>
+            <a:r>
+              <a:rPr lang="ko-KR" altLang="en-US" sz="1400" dirty="0">
+                <a:latin typeface="Roboto" panose="02000000000000000000" pitchFamily="2" charset="0"/>
+              </a:rPr>
+              <a:t>를 보내면 안됨</a:t>
+            </a:r>
+            <a:endParaRPr lang="en-US" altLang="ko-KR" sz="1400" dirty="0">
+              <a:latin typeface="Roboto" panose="02000000000000000000" pitchFamily="2" charset="0"/>
+            </a:endParaRPr>
+          </a:p>
+        </p:txBody>
+      </p:sp>
     </p:spTree>
     <p:extLst>
       <p:ext uri="{BB962C8B-B14F-4D97-AF65-F5344CB8AC3E}">
         <p14:creationId xmlns:p14="http://schemas.microsoft.com/office/powerpoint/2010/main" val="2569842624"/>
+      </p:ext>
+    </p:extLst>
+  </p:cSld>
+  <p:clrMapOvr>
+    <a:masterClrMapping/>
+  </p:clrMapOvr>
+</p:sld>
+</file>
+
+<file path=ppt/slides/slide29.xml><?xml version="1.0" encoding="utf-8"?>
+<p:sld xmlns:a="http://schemas.openxmlformats.org/drawingml/2006/main" xmlns:r="http://schemas.openxmlformats.org/officeDocument/2006/relationships" xmlns:p="http://schemas.openxmlformats.org/presentationml/2006/main">
+  <p:cSld>
+    <p:spTree>
+      <p:nvGrpSpPr>
+        <p:cNvPr id="1" name=""/>
+        <p:cNvGrpSpPr/>
+        <p:nvPr/>
+      </p:nvGrpSpPr>
+      <p:grpSpPr>
+        <a:xfrm>
+          <a:off x="0" y="0"/>
+          <a:ext cx="0" cy="0"/>
+          <a:chOff x="0" y="0"/>
+          <a:chExt cx="0" cy="0"/>
+        </a:xfrm>
+      </p:grpSpPr>
+      <p:sp>
+        <p:nvSpPr>
+          <p:cNvPr id="2" name="제목 1">
+            <a:extLst>
+              <a:ext uri="{FF2B5EF4-FFF2-40B4-BE49-F238E27FC236}">
+                <a16:creationId xmlns:a16="http://schemas.microsoft.com/office/drawing/2014/main" id="{8C9AF931-2C38-43C8-9E3C-AED4EC2E41A6}"/>
+              </a:ext>
+            </a:extLst>
+          </p:cNvPr>
+          <p:cNvSpPr>
+            <a:spLocks noGrp="1"/>
+          </p:cNvSpPr>
+          <p:nvPr>
+            <p:ph type="title"/>
+          </p:nvPr>
+        </p:nvSpPr>
+        <p:spPr>
+          <a:xfrm>
+            <a:off x="0" y="0"/>
+            <a:ext cx="12192000" cy="549275"/>
+          </a:xfrm>
+        </p:spPr>
+        <p:txBody>
+          <a:bodyPr/>
+          <a:lstStyle/>
+          <a:p>
+            <a:r>
+              <a:rPr lang="en-US" altLang="ko-KR" dirty="0"/>
+              <a:t>7. Terminating a Session – Overview</a:t>
+            </a:r>
+            <a:endParaRPr lang="ko-KR" altLang="en-US" dirty="0"/>
+          </a:p>
+        </p:txBody>
+      </p:sp>
+      <p:sp>
+        <p:nvSpPr>
+          <p:cNvPr id="4" name="슬라이드 번호 개체 틀 3">
+            <a:extLst>
+              <a:ext uri="{FF2B5EF4-FFF2-40B4-BE49-F238E27FC236}">
+                <a16:creationId xmlns:a16="http://schemas.microsoft.com/office/drawing/2014/main" id="{63151CCF-057C-4F06-8A51-C3671F753532}"/>
+              </a:ext>
+            </a:extLst>
+          </p:cNvPr>
+          <p:cNvSpPr>
+            <a:spLocks noGrp="1"/>
+          </p:cNvSpPr>
+          <p:nvPr>
+            <p:ph type="sldNum" sz="quarter" idx="12"/>
+          </p:nvPr>
+        </p:nvSpPr>
+        <p:spPr/>
+        <p:txBody>
+          <a:bodyPr/>
+          <a:lstStyle/>
+          <a:p>
+            <a:fld id="{A9252A94-CC09-4928-8209-20295AE91AEF}" type="slidenum">
+              <a:rPr lang="ko-KR" altLang="en-US" smtClean="0"/>
+              <a:t>29</a:t>
+            </a:fld>
+            <a:endParaRPr lang="ko-KR" altLang="en-US"/>
+          </a:p>
+        </p:txBody>
+      </p:sp>
+      <p:sp>
+        <p:nvSpPr>
+          <p:cNvPr id="3" name="직사각형 2">
+            <a:extLst>
+              <a:ext uri="{FF2B5EF4-FFF2-40B4-BE49-F238E27FC236}">
+                <a16:creationId xmlns:a16="http://schemas.microsoft.com/office/drawing/2014/main" id="{937B69BB-790A-FA9D-BB70-4FB7D8C70E52}"/>
+              </a:ext>
+            </a:extLst>
+          </p:cNvPr>
+          <p:cNvSpPr/>
+          <p:nvPr/>
+        </p:nvSpPr>
+        <p:spPr>
+          <a:xfrm>
+            <a:off x="751367" y="923181"/>
+            <a:ext cx="11147556" cy="2614818"/>
+          </a:xfrm>
+          <a:prstGeom prst="rect">
+            <a:avLst/>
+          </a:prstGeom>
+        </p:spPr>
+        <p:txBody>
+          <a:bodyPr wrap="square">
+            <a:spAutoFit/>
+          </a:bodyPr>
+          <a:lstStyle/>
+          <a:p>
+            <a:pPr marL="285750" indent="-285750">
+              <a:lnSpc>
+                <a:spcPct val="200000"/>
+              </a:lnSpc>
+              <a:buFont typeface="Arial" panose="020B0604020202020204" pitchFamily="34" charset="0"/>
+              <a:buChar char="•"/>
+            </a:pPr>
+            <a:r>
+              <a:rPr lang="en-US" altLang="ko-KR" sz="1400" dirty="0">
+                <a:latin typeface="Roboto" panose="02000000000000000000" pitchFamily="2" charset="0"/>
+              </a:rPr>
+              <a:t>“</a:t>
+            </a:r>
+            <a:r>
+              <a:rPr lang="en-US" altLang="ko-KR" sz="1400" b="1" dirty="0">
+                <a:latin typeface="Roboto" panose="02000000000000000000" pitchFamily="2" charset="0"/>
+              </a:rPr>
+              <a:t>hanging up</a:t>
+            </a:r>
+            <a:r>
+              <a:rPr lang="en-US" altLang="ko-KR" sz="1400" dirty="0">
+                <a:latin typeface="Roboto" panose="02000000000000000000" pitchFamily="2" charset="0"/>
+              </a:rPr>
+              <a:t>” </a:t>
+            </a:r>
+            <a:r>
+              <a:rPr lang="ko-KR" altLang="en-US" sz="1400" dirty="0">
+                <a:latin typeface="Roboto" panose="02000000000000000000" pitchFamily="2" charset="0"/>
+              </a:rPr>
+              <a:t>은</a:t>
+            </a:r>
+            <a:r>
+              <a:rPr lang="en-US" altLang="ko-KR" sz="1400" dirty="0">
+                <a:latin typeface="Roboto" panose="02000000000000000000" pitchFamily="2" charset="0"/>
+              </a:rPr>
+              <a:t> </a:t>
+            </a:r>
+            <a:r>
+              <a:rPr lang="ko-KR" altLang="en-US" sz="1400" dirty="0">
+                <a:latin typeface="Roboto" panose="02000000000000000000" pitchFamily="2" charset="0"/>
+              </a:rPr>
+              <a:t>세션을 게시를 종료하고</a:t>
+            </a:r>
+            <a:r>
+              <a:rPr lang="en-US" altLang="ko-KR" sz="1400" dirty="0">
+                <a:latin typeface="Roboto" panose="02000000000000000000" pitchFamily="2" charset="0"/>
+              </a:rPr>
+              <a:t>, </a:t>
+            </a:r>
+            <a:r>
+              <a:rPr lang="ko-KR" altLang="en-US" sz="1400" dirty="0">
+                <a:latin typeface="Roboto" panose="02000000000000000000" pitchFamily="2" charset="0"/>
+              </a:rPr>
+              <a:t>이미 생성된 세션을 종료하기를 바라는 상태</a:t>
+            </a:r>
+            <a:endParaRPr lang="en-US" altLang="ko-KR" sz="1400" dirty="0">
+              <a:latin typeface="Roboto" panose="02000000000000000000" pitchFamily="2" charset="0"/>
+            </a:endParaRPr>
+          </a:p>
+          <a:p>
+            <a:pPr marL="742950" lvl="1" indent="-285750">
+              <a:lnSpc>
+                <a:spcPct val="200000"/>
+              </a:lnSpc>
+              <a:buFont typeface="Arial" panose="020B0604020202020204" pitchFamily="34" charset="0"/>
+              <a:buChar char="•"/>
+            </a:pPr>
+            <a:r>
+              <a:rPr lang="en-US" altLang="ko-KR" sz="1400" b="1" dirty="0">
+                <a:latin typeface="Roboto" panose="02000000000000000000" pitchFamily="2" charset="0"/>
+              </a:rPr>
+              <a:t>Caller</a:t>
+            </a:r>
+            <a:r>
+              <a:rPr lang="ko-KR" altLang="en-US" sz="1400" dirty="0">
+                <a:latin typeface="Roboto" panose="02000000000000000000" pitchFamily="2" charset="0"/>
+              </a:rPr>
+              <a:t>의 </a:t>
+            </a:r>
+            <a:r>
+              <a:rPr lang="en-US" altLang="ko-KR" sz="1400" dirty="0">
+                <a:latin typeface="Roboto" panose="02000000000000000000" pitchFamily="2" charset="0"/>
+              </a:rPr>
+              <a:t>UA</a:t>
+            </a:r>
+            <a:r>
+              <a:rPr lang="ko-KR" altLang="en-US" sz="1400" dirty="0">
+                <a:latin typeface="Roboto" panose="02000000000000000000" pitchFamily="2" charset="0"/>
+              </a:rPr>
+              <a:t>에 대해</a:t>
+            </a:r>
+            <a:r>
+              <a:rPr lang="en-US" altLang="ko-KR" sz="1400" dirty="0">
+                <a:latin typeface="Roboto" panose="02000000000000000000" pitchFamily="2" charset="0"/>
+              </a:rPr>
+              <a:t>,</a:t>
+            </a:r>
+          </a:p>
+          <a:p>
+            <a:pPr marL="1200150" lvl="2" indent="-285750">
+              <a:lnSpc>
+                <a:spcPct val="200000"/>
+              </a:lnSpc>
+              <a:buFont typeface="Arial" panose="020B0604020202020204" pitchFamily="34" charset="0"/>
+              <a:buChar char="•"/>
+            </a:pPr>
+            <a:r>
+              <a:rPr lang="en-US" altLang="ko-KR" sz="1400" dirty="0">
+                <a:latin typeface="Roboto" panose="02000000000000000000" pitchFamily="2" charset="0"/>
+              </a:rPr>
+              <a:t>Caller </a:t>
+            </a:r>
+            <a:r>
+              <a:rPr lang="ko-KR" altLang="en-US" sz="1400" dirty="0">
+                <a:latin typeface="Roboto" panose="02000000000000000000" pitchFamily="2" charset="0"/>
+              </a:rPr>
+              <a:t>의 </a:t>
+            </a:r>
+            <a:r>
+              <a:rPr lang="en-US" altLang="ko-KR" sz="1400" dirty="0">
+                <a:latin typeface="Roboto" panose="02000000000000000000" pitchFamily="2" charset="0"/>
+              </a:rPr>
+              <a:t>UA</a:t>
+            </a:r>
+            <a:r>
+              <a:rPr lang="ko-KR" altLang="en-US" sz="1400" dirty="0">
+                <a:latin typeface="Roboto" panose="02000000000000000000" pitchFamily="2" charset="0"/>
+              </a:rPr>
+              <a:t>에 대해</a:t>
+            </a:r>
+            <a:r>
+              <a:rPr lang="en-US" altLang="ko-KR" sz="1400" dirty="0">
+                <a:latin typeface="Roboto" panose="02000000000000000000" pitchFamily="2" charset="0"/>
+              </a:rPr>
+              <a:t>, </a:t>
+            </a:r>
+            <a:r>
+              <a:rPr lang="ko-KR" altLang="en-US" sz="1400" dirty="0">
+                <a:latin typeface="Roboto" panose="02000000000000000000" pitchFamily="2" charset="0"/>
+              </a:rPr>
+              <a:t>초기 </a:t>
+            </a:r>
+            <a:r>
+              <a:rPr lang="en-US" altLang="ko-KR" sz="1400" b="1" dirty="0">
+                <a:latin typeface="Roboto" panose="02000000000000000000" pitchFamily="2" charset="0"/>
+              </a:rPr>
+              <a:t>INVITE</a:t>
+            </a:r>
+            <a:r>
+              <a:rPr lang="ko-KR" altLang="en-US" sz="1400" dirty="0">
+                <a:latin typeface="Roboto" panose="02000000000000000000" pitchFamily="2" charset="0"/>
+              </a:rPr>
+              <a:t>가 </a:t>
+            </a:r>
+            <a:r>
+              <a:rPr lang="en-US" altLang="ko-KR" sz="1400" dirty="0">
+                <a:latin typeface="Roboto" panose="02000000000000000000" pitchFamily="2" charset="0"/>
+              </a:rPr>
+              <a:t>final </a:t>
+            </a:r>
+            <a:r>
+              <a:rPr lang="ko-KR" altLang="en-US" sz="1400" dirty="0">
+                <a:latin typeface="Roboto" panose="02000000000000000000" pitchFamily="2" charset="0"/>
+              </a:rPr>
+              <a:t>응답을 생성하지 않았으면 이것은 </a:t>
+            </a:r>
+            <a:r>
+              <a:rPr lang="en-US" altLang="ko-KR" sz="1400" b="1" dirty="0">
+                <a:latin typeface="Roboto" panose="02000000000000000000" pitchFamily="2" charset="0"/>
+              </a:rPr>
+              <a:t>CANCEL</a:t>
+            </a:r>
+            <a:r>
+              <a:rPr lang="en-US" altLang="ko-KR" sz="1400" dirty="0">
+                <a:latin typeface="Roboto" panose="02000000000000000000" pitchFamily="2" charset="0"/>
+              </a:rPr>
+              <a:t> </a:t>
+            </a:r>
+            <a:r>
+              <a:rPr lang="ko-KR" altLang="en-US" sz="1400" dirty="0">
+                <a:latin typeface="Roboto" panose="02000000000000000000" pitchFamily="2" charset="0"/>
+              </a:rPr>
+              <a:t>요청을 의미</a:t>
+            </a:r>
+            <a:endParaRPr lang="en-US" altLang="ko-KR" sz="1400" dirty="0">
+              <a:latin typeface="Roboto" panose="02000000000000000000" pitchFamily="2" charset="0"/>
+            </a:endParaRPr>
+          </a:p>
+          <a:p>
+            <a:pPr marL="1200150" lvl="2" indent="-285750">
+              <a:lnSpc>
+                <a:spcPct val="200000"/>
+              </a:lnSpc>
+              <a:buFont typeface="Arial" panose="020B0604020202020204" pitchFamily="34" charset="0"/>
+              <a:buChar char="•"/>
+            </a:pPr>
+            <a:r>
+              <a:rPr lang="en-US" altLang="ko-KR" sz="1400" dirty="0">
+                <a:latin typeface="Roboto" panose="02000000000000000000" pitchFamily="2" charset="0"/>
+              </a:rPr>
+              <a:t>final </a:t>
+            </a:r>
+            <a:r>
+              <a:rPr lang="ko-KR" altLang="en-US" sz="1400" dirty="0">
+                <a:latin typeface="Roboto" panose="02000000000000000000" pitchFamily="2" charset="0"/>
+              </a:rPr>
+              <a:t>응답 이후의 모든 </a:t>
+            </a:r>
+            <a:r>
+              <a:rPr lang="en-US" altLang="ko-KR" sz="1400" b="1" dirty="0">
+                <a:latin typeface="Roboto" panose="02000000000000000000" pitchFamily="2" charset="0"/>
+              </a:rPr>
+              <a:t>confirmed</a:t>
+            </a:r>
+            <a:r>
+              <a:rPr lang="en-US" altLang="ko-KR" sz="1400" dirty="0">
+                <a:latin typeface="Roboto" panose="02000000000000000000" pitchFamily="2" charset="0"/>
+              </a:rPr>
+              <a:t> </a:t>
+            </a:r>
+            <a:r>
+              <a:rPr lang="ko-KR" altLang="en-US" sz="1400" dirty="0">
+                <a:latin typeface="Roboto" panose="02000000000000000000" pitchFamily="2" charset="0"/>
+              </a:rPr>
+              <a:t>다이얼로그에 대해 </a:t>
+            </a:r>
+            <a:r>
+              <a:rPr lang="en-US" altLang="ko-KR" sz="1400" dirty="0">
+                <a:latin typeface="Roboto" panose="02000000000000000000" pitchFamily="2" charset="0"/>
+              </a:rPr>
+              <a:t>BYE</a:t>
+            </a:r>
+            <a:r>
+              <a:rPr lang="ko-KR" altLang="en-US" sz="1400" dirty="0">
+                <a:latin typeface="Roboto" panose="02000000000000000000" pitchFamily="2" charset="0"/>
+              </a:rPr>
+              <a:t>를 의미</a:t>
+            </a:r>
+          </a:p>
+          <a:p>
+            <a:pPr marL="742950" lvl="1" indent="-285750">
+              <a:lnSpc>
+                <a:spcPct val="200000"/>
+              </a:lnSpc>
+              <a:buFont typeface="Arial" panose="020B0604020202020204" pitchFamily="34" charset="0"/>
+              <a:buChar char="•"/>
+            </a:pPr>
+            <a:r>
+              <a:rPr lang="en-US" altLang="ko-KR" sz="1400" b="1" dirty="0">
+                <a:latin typeface="Roboto" panose="02000000000000000000" pitchFamily="2" charset="0"/>
+              </a:rPr>
+              <a:t>Callee</a:t>
+            </a:r>
+            <a:r>
+              <a:rPr lang="ko-KR" altLang="en-US" sz="1400" dirty="0">
+                <a:latin typeface="Roboto" panose="02000000000000000000" pitchFamily="2" charset="0"/>
+              </a:rPr>
+              <a:t>의 </a:t>
+            </a:r>
+            <a:r>
+              <a:rPr lang="en-US" altLang="ko-KR" sz="1400" dirty="0">
+                <a:latin typeface="Roboto" panose="02000000000000000000" pitchFamily="2" charset="0"/>
+              </a:rPr>
+              <a:t>UA</a:t>
+            </a:r>
+            <a:r>
+              <a:rPr lang="ko-KR" altLang="en-US" sz="1400" dirty="0">
+                <a:latin typeface="Roboto" panose="02000000000000000000" pitchFamily="2" charset="0"/>
+              </a:rPr>
+              <a:t>에 대해</a:t>
+            </a:r>
+            <a:r>
+              <a:rPr lang="en-US" altLang="ko-KR" sz="1400" dirty="0">
+                <a:latin typeface="Roboto" panose="02000000000000000000" pitchFamily="2" charset="0"/>
+              </a:rPr>
+              <a:t>,</a:t>
+            </a:r>
+          </a:p>
+          <a:p>
+            <a:pPr marL="1200150" lvl="2" indent="-285750">
+              <a:lnSpc>
+                <a:spcPct val="200000"/>
+              </a:lnSpc>
+              <a:buFont typeface="Arial" panose="020B0604020202020204" pitchFamily="34" charset="0"/>
+              <a:buChar char="•"/>
+            </a:pPr>
+            <a:r>
+              <a:rPr lang="en-US" altLang="ko-KR" sz="1400" dirty="0">
+                <a:latin typeface="Roboto" panose="02000000000000000000" pitchFamily="2" charset="0"/>
+              </a:rPr>
+              <a:t>BYE</a:t>
+            </a:r>
+            <a:r>
+              <a:rPr lang="ko-KR" altLang="en-US" sz="1400" dirty="0">
+                <a:latin typeface="Roboto" panose="02000000000000000000" pitchFamily="2" charset="0"/>
+              </a:rPr>
+              <a:t>를 의미</a:t>
+            </a:r>
+            <a:endParaRPr lang="en-US" altLang="ko-KR" sz="1400" dirty="0">
+              <a:latin typeface="Roboto" panose="02000000000000000000" pitchFamily="2" charset="0"/>
+            </a:endParaRPr>
+          </a:p>
+        </p:txBody>
+      </p:sp>
+    </p:spTree>
+    <p:extLst>
+      <p:ext uri="{BB962C8B-B14F-4D97-AF65-F5344CB8AC3E}">
+        <p14:creationId xmlns:p14="http://schemas.microsoft.com/office/powerpoint/2010/main" val="2221590793"/>
       </p:ext>
     </p:extLst>
   </p:cSld>
@@ -21956,6 +23190,885 @@
 </p:sld>
 </file>
 
+<file path=ppt/slides/slide30.xml><?xml version="1.0" encoding="utf-8"?>
+<p:sld xmlns:a="http://schemas.openxmlformats.org/drawingml/2006/main" xmlns:r="http://schemas.openxmlformats.org/officeDocument/2006/relationships" xmlns:p="http://schemas.openxmlformats.org/presentationml/2006/main">
+  <p:cSld>
+    <p:spTree>
+      <p:nvGrpSpPr>
+        <p:cNvPr id="1" name=""/>
+        <p:cNvGrpSpPr/>
+        <p:nvPr/>
+      </p:nvGrpSpPr>
+      <p:grpSpPr>
+        <a:xfrm>
+          <a:off x="0" y="0"/>
+          <a:ext cx="0" cy="0"/>
+          <a:chOff x="0" y="0"/>
+          <a:chExt cx="0" cy="0"/>
+        </a:xfrm>
+      </p:grpSpPr>
+      <p:sp>
+        <p:nvSpPr>
+          <p:cNvPr id="2" name="제목 1">
+            <a:extLst>
+              <a:ext uri="{FF2B5EF4-FFF2-40B4-BE49-F238E27FC236}">
+                <a16:creationId xmlns:a16="http://schemas.microsoft.com/office/drawing/2014/main" id="{8C9AF931-2C38-43C8-9E3C-AED4EC2E41A6}"/>
+              </a:ext>
+            </a:extLst>
+          </p:cNvPr>
+          <p:cNvSpPr>
+            <a:spLocks noGrp="1"/>
+          </p:cNvSpPr>
+          <p:nvPr>
+            <p:ph type="title"/>
+          </p:nvPr>
+        </p:nvSpPr>
+        <p:spPr>
+          <a:xfrm>
+            <a:off x="0" y="0"/>
+            <a:ext cx="12192000" cy="549275"/>
+          </a:xfrm>
+        </p:spPr>
+        <p:txBody>
+          <a:bodyPr/>
+          <a:lstStyle/>
+          <a:p>
+            <a:r>
+              <a:rPr lang="en-US" altLang="ko-KR" dirty="0"/>
+              <a:t>7. Terminating a Session – Terminating a Session with a BYE Request (1)</a:t>
+            </a:r>
+            <a:endParaRPr lang="ko-KR" altLang="en-US" dirty="0"/>
+          </a:p>
+        </p:txBody>
+      </p:sp>
+      <p:sp>
+        <p:nvSpPr>
+          <p:cNvPr id="4" name="슬라이드 번호 개체 틀 3">
+            <a:extLst>
+              <a:ext uri="{FF2B5EF4-FFF2-40B4-BE49-F238E27FC236}">
+                <a16:creationId xmlns:a16="http://schemas.microsoft.com/office/drawing/2014/main" id="{63151CCF-057C-4F06-8A51-C3671F753532}"/>
+              </a:ext>
+            </a:extLst>
+          </p:cNvPr>
+          <p:cNvSpPr>
+            <a:spLocks noGrp="1"/>
+          </p:cNvSpPr>
+          <p:nvPr>
+            <p:ph type="sldNum" sz="quarter" idx="12"/>
+          </p:nvPr>
+        </p:nvSpPr>
+        <p:spPr/>
+        <p:txBody>
+          <a:bodyPr/>
+          <a:lstStyle/>
+          <a:p>
+            <a:fld id="{A9252A94-CC09-4928-8209-20295AE91AEF}" type="slidenum">
+              <a:rPr lang="ko-KR" altLang="en-US" smtClean="0"/>
+              <a:t>30</a:t>
+            </a:fld>
+            <a:endParaRPr lang="ko-KR" altLang="en-US" dirty="0"/>
+          </a:p>
+        </p:txBody>
+      </p:sp>
+      <p:sp>
+        <p:nvSpPr>
+          <p:cNvPr id="7" name="직사각형 6">
+            <a:extLst>
+              <a:ext uri="{FF2B5EF4-FFF2-40B4-BE49-F238E27FC236}">
+                <a16:creationId xmlns:a16="http://schemas.microsoft.com/office/drawing/2014/main" id="{B96D8D85-7A40-F3D2-6B34-102DF4993474}"/>
+              </a:ext>
+            </a:extLst>
+          </p:cNvPr>
+          <p:cNvSpPr/>
+          <p:nvPr/>
+        </p:nvSpPr>
+        <p:spPr>
+          <a:xfrm>
+            <a:off x="747651" y="923181"/>
+            <a:ext cx="10301609" cy="2377189"/>
+          </a:xfrm>
+          <a:prstGeom prst="rect">
+            <a:avLst/>
+          </a:prstGeom>
+        </p:spPr>
+        <p:txBody>
+          <a:bodyPr wrap="square">
+            <a:spAutoFit/>
+          </a:bodyPr>
+          <a:lstStyle/>
+          <a:p>
+            <a:pPr>
+              <a:lnSpc>
+                <a:spcPct val="200000"/>
+              </a:lnSpc>
+            </a:pPr>
+            <a:r>
+              <a:rPr lang="en-US" altLang="ko-KR" sz="1600" b="1" u="sng" dirty="0">
+                <a:latin typeface="Roboto" panose="02000000000000000000" pitchFamily="2" charset="0"/>
+              </a:rPr>
+              <a:t>UAC Behavior</a:t>
+            </a:r>
+            <a:r>
+              <a:rPr lang="en-US" altLang="ko-KR" sz="1600" b="1" dirty="0">
+                <a:latin typeface="Roboto" panose="02000000000000000000" pitchFamily="2" charset="0"/>
+              </a:rPr>
+              <a:t> </a:t>
+            </a:r>
+          </a:p>
+          <a:p>
+            <a:pPr marL="285750" indent="-285750">
+              <a:lnSpc>
+                <a:spcPct val="200000"/>
+              </a:lnSpc>
+              <a:buFont typeface="Arial" panose="020B0604020202020204" pitchFamily="34" charset="0"/>
+              <a:buChar char="•"/>
+            </a:pPr>
+            <a:r>
+              <a:rPr lang="en-US" altLang="ko-KR" sz="1200" dirty="0">
+                <a:latin typeface="Roboto" panose="02000000000000000000" pitchFamily="2" charset="0"/>
+              </a:rPr>
+              <a:t>BYE </a:t>
+            </a:r>
+            <a:r>
+              <a:rPr lang="ko-KR" altLang="en-US" sz="1200" dirty="0">
+                <a:latin typeface="Roboto" panose="02000000000000000000" pitchFamily="2" charset="0"/>
+              </a:rPr>
+              <a:t>요청 구성</a:t>
+            </a:r>
+            <a:endParaRPr lang="en-US" altLang="ko-KR" sz="1200" dirty="0">
+              <a:latin typeface="Roboto" panose="02000000000000000000" pitchFamily="2" charset="0"/>
+            </a:endParaRPr>
+          </a:p>
+          <a:p>
+            <a:pPr marL="285750" indent="-285750">
+              <a:lnSpc>
+                <a:spcPct val="200000"/>
+              </a:lnSpc>
+              <a:buFont typeface="Arial" panose="020B0604020202020204" pitchFamily="34" charset="0"/>
+              <a:buChar char="•"/>
+            </a:pPr>
+            <a:r>
+              <a:rPr lang="en-US" altLang="ko-KR" sz="1200" dirty="0">
+                <a:latin typeface="Roboto" panose="02000000000000000000" pitchFamily="2" charset="0"/>
+              </a:rPr>
+              <a:t>BYE</a:t>
+            </a:r>
+            <a:r>
+              <a:rPr lang="ko-KR" altLang="en-US" sz="1200" dirty="0">
+                <a:latin typeface="Roboto" panose="02000000000000000000" pitchFamily="2" charset="0"/>
+              </a:rPr>
+              <a:t>가 구성되면  </a:t>
+            </a:r>
+            <a:r>
+              <a:rPr lang="en-US" altLang="ko-KR" sz="1200" dirty="0">
+                <a:latin typeface="Roboto" panose="02000000000000000000" pitchFamily="2" charset="0"/>
+              </a:rPr>
+              <a:t>UAC </a:t>
+            </a:r>
+            <a:r>
+              <a:rPr lang="ko-KR" altLang="en-US" sz="1200" dirty="0">
+                <a:latin typeface="Roboto" panose="02000000000000000000" pitchFamily="2" charset="0"/>
+              </a:rPr>
+              <a:t>코어는 새로운 </a:t>
+            </a:r>
+            <a:r>
+              <a:rPr lang="en-US" altLang="ko-KR" sz="1200" b="1" dirty="0">
+                <a:latin typeface="Roboto" panose="02000000000000000000" pitchFamily="2" charset="0"/>
+              </a:rPr>
+              <a:t>non-INVITE </a:t>
+            </a:r>
+            <a:r>
+              <a:rPr lang="en-US" altLang="ko-KR" sz="1200" dirty="0">
+                <a:latin typeface="Roboto" panose="02000000000000000000" pitchFamily="2" charset="0"/>
+              </a:rPr>
+              <a:t>client transaction </a:t>
+            </a:r>
+            <a:r>
+              <a:rPr lang="ko-KR" altLang="en-US" sz="1200" dirty="0">
+                <a:latin typeface="Roboto" panose="02000000000000000000" pitchFamily="2" charset="0"/>
+              </a:rPr>
+              <a:t>을 생성</a:t>
+            </a:r>
+            <a:r>
+              <a:rPr lang="en-US" altLang="ko-KR" sz="1200" dirty="0">
+                <a:latin typeface="Roboto" panose="02000000000000000000" pitchFamily="2" charset="0"/>
+              </a:rPr>
+              <a:t> </a:t>
+            </a:r>
+            <a:r>
+              <a:rPr lang="ko-KR" altLang="en-US" sz="1200" dirty="0">
+                <a:latin typeface="Roboto" panose="02000000000000000000" pitchFamily="2" charset="0"/>
+              </a:rPr>
+              <a:t>하고 </a:t>
+            </a:r>
+            <a:r>
+              <a:rPr lang="en-US" altLang="ko-KR" sz="1200" dirty="0">
+                <a:latin typeface="Roboto" panose="02000000000000000000" pitchFamily="2" charset="0"/>
+              </a:rPr>
+              <a:t>BYE </a:t>
+            </a:r>
+            <a:r>
+              <a:rPr lang="ko-KR" altLang="en-US" sz="1200" dirty="0">
+                <a:latin typeface="Roboto" panose="02000000000000000000" pitchFamily="2" charset="0"/>
+              </a:rPr>
+              <a:t>요청을 전달</a:t>
+            </a:r>
+            <a:endParaRPr lang="en-US" altLang="ko-KR" sz="1200" dirty="0">
+              <a:latin typeface="Roboto" panose="02000000000000000000" pitchFamily="2" charset="0"/>
+            </a:endParaRPr>
+          </a:p>
+          <a:p>
+            <a:pPr marL="285750" indent="-285750">
+              <a:lnSpc>
+                <a:spcPct val="200000"/>
+              </a:lnSpc>
+              <a:buFont typeface="Arial" panose="020B0604020202020204" pitchFamily="34" charset="0"/>
+              <a:buChar char="•"/>
+            </a:pPr>
+            <a:r>
+              <a:rPr lang="en-US" altLang="ko-KR" sz="1200" dirty="0">
+                <a:latin typeface="Roboto" panose="02000000000000000000" pitchFamily="2" charset="0"/>
+              </a:rPr>
+              <a:t>UAC</a:t>
+            </a:r>
+            <a:r>
+              <a:rPr lang="ko-KR" altLang="en-US" sz="1200" dirty="0">
+                <a:latin typeface="Roboto" panose="02000000000000000000" pitchFamily="2" charset="0"/>
+              </a:rPr>
+              <a:t>는 </a:t>
+            </a:r>
+            <a:r>
+              <a:rPr lang="en-US" altLang="ko-KR" sz="1200" dirty="0">
+                <a:latin typeface="Roboto" panose="02000000000000000000" pitchFamily="2" charset="0"/>
+              </a:rPr>
+              <a:t>BYE </a:t>
+            </a:r>
+            <a:r>
+              <a:rPr lang="ko-KR" altLang="en-US" sz="1200" dirty="0">
+                <a:latin typeface="Roboto" panose="02000000000000000000" pitchFamily="2" charset="0"/>
+              </a:rPr>
+              <a:t>요청이 </a:t>
+            </a:r>
+            <a:r>
+              <a:rPr lang="en-US" altLang="ko-KR" sz="1200" dirty="0">
+                <a:latin typeface="Roboto" panose="02000000000000000000" pitchFamily="2" charset="0"/>
+              </a:rPr>
+              <a:t>client transaction </a:t>
+            </a:r>
+            <a:r>
+              <a:rPr lang="ko-KR" altLang="en-US" sz="1200" dirty="0">
+                <a:latin typeface="Roboto" panose="02000000000000000000" pitchFamily="2" charset="0"/>
+              </a:rPr>
+              <a:t>에 전달되는 즉시 세션이 종료된 것으로 간주해야 함 </a:t>
+            </a:r>
+            <a:endParaRPr lang="en-US" altLang="ko-KR" sz="1400" dirty="0">
+              <a:latin typeface="Roboto" panose="02000000000000000000" pitchFamily="2" charset="0"/>
+            </a:endParaRPr>
+          </a:p>
+          <a:p>
+            <a:pPr marL="285750" indent="-285750" algn="just">
+              <a:lnSpc>
+                <a:spcPct val="200000"/>
+              </a:lnSpc>
+              <a:buFont typeface="Arial" panose="020B0604020202020204" pitchFamily="34" charset="0"/>
+              <a:buChar char="•"/>
+            </a:pPr>
+            <a:r>
+              <a:rPr lang="en-US" altLang="ko-KR" sz="1200" dirty="0">
+                <a:latin typeface="Roboto" panose="02000000000000000000" pitchFamily="2" charset="0"/>
+              </a:rPr>
+              <a:t>BYE </a:t>
+            </a:r>
+            <a:r>
+              <a:rPr lang="ko-KR" altLang="en-US" sz="1200" dirty="0">
+                <a:latin typeface="Roboto" panose="02000000000000000000" pitchFamily="2" charset="0"/>
+              </a:rPr>
+              <a:t>에 대한 응답이 </a:t>
+            </a:r>
+            <a:r>
+              <a:rPr lang="en-US" altLang="ko-KR" sz="1200" b="1" dirty="0">
+                <a:latin typeface="Roboto" panose="02000000000000000000" pitchFamily="2" charset="0"/>
+              </a:rPr>
+              <a:t>481(Call/Transaction)</a:t>
+            </a:r>
+            <a:r>
+              <a:rPr lang="ko-KR" altLang="en-US" sz="1200" b="1" dirty="0">
+                <a:latin typeface="Roboto" panose="02000000000000000000" pitchFamily="2" charset="0"/>
+              </a:rPr>
+              <a:t> </a:t>
+            </a:r>
+            <a:r>
+              <a:rPr lang="ko-KR" altLang="en-US" sz="1200" dirty="0">
+                <a:latin typeface="Roboto" panose="02000000000000000000" pitchFamily="2" charset="0"/>
+              </a:rPr>
+              <a:t>또는 </a:t>
+            </a:r>
+            <a:r>
+              <a:rPr lang="en-US" altLang="ko-KR" sz="1200" b="1" dirty="0">
+                <a:latin typeface="Roboto" panose="02000000000000000000" pitchFamily="2" charset="0"/>
+              </a:rPr>
+              <a:t>408(Request</a:t>
+            </a:r>
+            <a:r>
+              <a:rPr lang="ko-KR" altLang="en-US" sz="1200" b="1" dirty="0">
+                <a:latin typeface="Roboto" panose="02000000000000000000" pitchFamily="2" charset="0"/>
+              </a:rPr>
+              <a:t> </a:t>
+            </a:r>
+            <a:r>
+              <a:rPr lang="en-US" altLang="ko-KR" sz="1200" b="1" dirty="0">
+                <a:latin typeface="Roboto" panose="02000000000000000000" pitchFamily="2" charset="0"/>
+              </a:rPr>
+              <a:t>Timeout)</a:t>
+            </a:r>
+            <a:r>
+              <a:rPr lang="ko-KR" altLang="en-US" sz="1200" dirty="0">
+                <a:latin typeface="Roboto" panose="02000000000000000000" pitchFamily="2" charset="0"/>
+              </a:rPr>
+              <a:t>이거나 </a:t>
+            </a:r>
+            <a:r>
+              <a:rPr lang="en-US" altLang="ko-KR" sz="1200" dirty="0">
+                <a:latin typeface="Roboto" panose="02000000000000000000" pitchFamily="2" charset="0"/>
+              </a:rPr>
+              <a:t>BYE</a:t>
+            </a:r>
+            <a:r>
+              <a:rPr lang="ko-KR" altLang="en-US" sz="1200" dirty="0">
+                <a:latin typeface="Roboto" panose="02000000000000000000" pitchFamily="2" charset="0"/>
+              </a:rPr>
+              <a:t>에 대한 응답이 전혀 수신되지 않는 경우</a:t>
+            </a:r>
+            <a:r>
+              <a:rPr lang="en-US" altLang="ko-KR" sz="1200" dirty="0">
+                <a:latin typeface="Roboto" panose="02000000000000000000" pitchFamily="2" charset="0"/>
+              </a:rPr>
+              <a:t>, UAC </a:t>
+            </a:r>
+            <a:r>
+              <a:rPr lang="ko-KR" altLang="en-US" sz="1200" dirty="0">
+                <a:latin typeface="Roboto" panose="02000000000000000000" pitchFamily="2" charset="0"/>
+              </a:rPr>
+              <a:t>는 세션 및 다이얼로그가 종료된 것으로 간주</a:t>
+            </a:r>
+            <a:endParaRPr lang="en-US" altLang="ko-KR" sz="1200" dirty="0">
+              <a:latin typeface="Roboto" panose="02000000000000000000" pitchFamily="2" charset="0"/>
+            </a:endParaRPr>
+          </a:p>
+        </p:txBody>
+      </p:sp>
+      <p:sp>
+        <p:nvSpPr>
+          <p:cNvPr id="8" name="직사각형 7">
+            <a:extLst>
+              <a:ext uri="{FF2B5EF4-FFF2-40B4-BE49-F238E27FC236}">
+                <a16:creationId xmlns:a16="http://schemas.microsoft.com/office/drawing/2014/main" id="{A1CA72A3-9CFB-0F84-913B-2A944CB42F73}"/>
+              </a:ext>
+            </a:extLst>
+          </p:cNvPr>
+          <p:cNvSpPr/>
+          <p:nvPr/>
+        </p:nvSpPr>
+        <p:spPr>
+          <a:xfrm>
+            <a:off x="747651" y="3557631"/>
+            <a:ext cx="10301609" cy="2870016"/>
+          </a:xfrm>
+          <a:prstGeom prst="rect">
+            <a:avLst/>
+          </a:prstGeom>
+        </p:spPr>
+        <p:txBody>
+          <a:bodyPr wrap="square">
+            <a:spAutoFit/>
+          </a:bodyPr>
+          <a:lstStyle/>
+          <a:p>
+            <a:pPr>
+              <a:lnSpc>
+                <a:spcPct val="200000"/>
+              </a:lnSpc>
+            </a:pPr>
+            <a:r>
+              <a:rPr lang="en-US" altLang="ko-KR" sz="1600" b="1" u="sng" dirty="0">
+                <a:latin typeface="Roboto" panose="02000000000000000000" pitchFamily="2" charset="0"/>
+              </a:rPr>
+              <a:t>UAS Behavior</a:t>
+            </a:r>
+          </a:p>
+          <a:p>
+            <a:pPr marL="285750" indent="-285750">
+              <a:lnSpc>
+                <a:spcPct val="200000"/>
+              </a:lnSpc>
+              <a:buFont typeface="Arial" panose="020B0604020202020204" pitchFamily="34" charset="0"/>
+              <a:buChar char="•"/>
+            </a:pPr>
+            <a:r>
+              <a:rPr lang="en-US" altLang="ko-KR" sz="1400" dirty="0">
+                <a:latin typeface="Roboto" panose="02000000000000000000" pitchFamily="2" charset="0"/>
+              </a:rPr>
+              <a:t>BYE </a:t>
+            </a:r>
+            <a:r>
+              <a:rPr lang="ko-KR" altLang="en-US" sz="1400" dirty="0">
+                <a:latin typeface="Roboto" panose="02000000000000000000" pitchFamily="2" charset="0"/>
+              </a:rPr>
+              <a:t>요청 처리</a:t>
+            </a:r>
+            <a:endParaRPr lang="en-US" altLang="ko-KR" sz="1400" dirty="0">
+              <a:latin typeface="Roboto" panose="02000000000000000000" pitchFamily="2" charset="0"/>
+            </a:endParaRPr>
+          </a:p>
+          <a:p>
+            <a:pPr marL="285750" indent="-285750">
+              <a:lnSpc>
+                <a:spcPct val="200000"/>
+              </a:lnSpc>
+              <a:buFont typeface="Arial" panose="020B0604020202020204" pitchFamily="34" charset="0"/>
+              <a:buChar char="•"/>
+            </a:pPr>
+            <a:r>
+              <a:rPr lang="en-US" altLang="ko-KR" sz="1400" dirty="0">
+                <a:latin typeface="Roboto" panose="02000000000000000000" pitchFamily="2" charset="0"/>
+              </a:rPr>
+              <a:t>BYE </a:t>
+            </a:r>
+            <a:r>
+              <a:rPr lang="ko-KR" altLang="en-US" sz="1400" dirty="0">
+                <a:latin typeface="Roboto" panose="02000000000000000000" pitchFamily="2" charset="0"/>
+              </a:rPr>
+              <a:t>요청을 수신하는 </a:t>
+            </a:r>
+            <a:r>
+              <a:rPr lang="en-US" altLang="ko-KR" sz="1400" dirty="0">
+                <a:latin typeface="Roboto" panose="02000000000000000000" pitchFamily="2" charset="0"/>
+              </a:rPr>
+              <a:t>UAS core </a:t>
+            </a:r>
+            <a:r>
+              <a:rPr lang="ko-KR" altLang="en-US" sz="1400" dirty="0">
+                <a:latin typeface="Roboto" panose="02000000000000000000" pitchFamily="2" charset="0"/>
+              </a:rPr>
+              <a:t>는 기존 다이얼로그와 일치하는 지 검사</a:t>
+            </a:r>
+            <a:endParaRPr lang="en-US" altLang="ko-KR" sz="1400" dirty="0">
+              <a:latin typeface="Roboto" panose="02000000000000000000" pitchFamily="2" charset="0"/>
+            </a:endParaRPr>
+          </a:p>
+          <a:p>
+            <a:pPr marL="742950" lvl="1" indent="-285750">
+              <a:lnSpc>
+                <a:spcPct val="200000"/>
+              </a:lnSpc>
+              <a:buFont typeface="Arial" panose="020B0604020202020204" pitchFamily="34" charset="0"/>
+              <a:buChar char="•"/>
+            </a:pPr>
+            <a:r>
+              <a:rPr lang="ko-KR" altLang="en-US" sz="1200" b="1" dirty="0">
+                <a:latin typeface="Roboto" panose="02000000000000000000" pitchFamily="2" charset="0"/>
+              </a:rPr>
+              <a:t>일치하지 않으면</a:t>
+            </a:r>
+            <a:r>
+              <a:rPr lang="en-US" altLang="ko-KR" sz="1200" b="1" dirty="0">
+                <a:latin typeface="Roboto" panose="02000000000000000000" pitchFamily="2" charset="0"/>
+              </a:rPr>
+              <a:t>, UAS core </a:t>
+            </a:r>
+            <a:r>
+              <a:rPr lang="ko-KR" altLang="en-US" sz="1200" b="1" dirty="0">
+                <a:latin typeface="Roboto" panose="02000000000000000000" pitchFamily="2" charset="0"/>
+              </a:rPr>
+              <a:t>는 </a:t>
+            </a:r>
+            <a:r>
+              <a:rPr lang="en-US" altLang="ko-KR" sz="1200" b="1" dirty="0">
+                <a:latin typeface="Roboto" panose="02000000000000000000" pitchFamily="2" charset="0"/>
+              </a:rPr>
+              <a:t>481 (Call/Transaction Does Not Exist) </a:t>
+            </a:r>
+            <a:r>
+              <a:rPr lang="ko-KR" altLang="en-US" sz="1200" b="1" dirty="0">
+                <a:latin typeface="Roboto" panose="02000000000000000000" pitchFamily="2" charset="0"/>
+              </a:rPr>
+              <a:t>응답을 생성하고 그것을 </a:t>
+            </a:r>
+            <a:r>
+              <a:rPr lang="en-US" altLang="ko-KR" sz="1200" b="1" dirty="0">
+                <a:latin typeface="Roboto" panose="02000000000000000000" pitchFamily="2" charset="0"/>
+              </a:rPr>
+              <a:t>server transaction </a:t>
+            </a:r>
+            <a:r>
+              <a:rPr lang="ko-KR" altLang="en-US" sz="1200" b="1" dirty="0">
+                <a:latin typeface="Roboto" panose="02000000000000000000" pitchFamily="2" charset="0"/>
+              </a:rPr>
+              <a:t>으로 보냄</a:t>
+            </a:r>
+            <a:endParaRPr lang="en-US" altLang="ko-KR" sz="1200" b="1" dirty="0">
+              <a:latin typeface="Roboto" panose="02000000000000000000" pitchFamily="2" charset="0"/>
+            </a:endParaRPr>
+          </a:p>
+          <a:p>
+            <a:pPr marL="742950" lvl="1" indent="-285750">
+              <a:lnSpc>
+                <a:spcPct val="200000"/>
+              </a:lnSpc>
+              <a:buFont typeface="Arial" panose="020B0604020202020204" pitchFamily="34" charset="0"/>
+              <a:buChar char="•"/>
+            </a:pPr>
+            <a:r>
+              <a:rPr lang="ko-KR" altLang="en-US" sz="1200" b="1" dirty="0">
+                <a:latin typeface="Roboto" panose="02000000000000000000" pitchFamily="2" charset="0"/>
+              </a:rPr>
+              <a:t>기존 다이얼로그에  </a:t>
+            </a:r>
+            <a:r>
+              <a:rPr lang="en-US" altLang="ko-KR" sz="1200" b="1" dirty="0">
+                <a:latin typeface="Roboto" panose="02000000000000000000" pitchFamily="2" charset="0"/>
+              </a:rPr>
+              <a:t>BYE </a:t>
+            </a:r>
+            <a:r>
+              <a:rPr lang="ko-KR" altLang="en-US" sz="1200" b="1" dirty="0">
+                <a:latin typeface="Roboto" panose="02000000000000000000" pitchFamily="2" charset="0"/>
+              </a:rPr>
+              <a:t>요청을 수신하는 </a:t>
+            </a:r>
+            <a:r>
+              <a:rPr lang="en-US" altLang="ko-KR" sz="1200" b="1" dirty="0">
+                <a:latin typeface="Roboto" panose="02000000000000000000" pitchFamily="2" charset="0"/>
+              </a:rPr>
+              <a:t>UAS core </a:t>
+            </a:r>
+            <a:r>
+              <a:rPr lang="ko-KR" altLang="en-US" sz="1200" b="1" dirty="0">
+                <a:latin typeface="Roboto" panose="02000000000000000000" pitchFamily="2" charset="0"/>
+              </a:rPr>
+              <a:t>는 요청 처리 절차를 따름</a:t>
+            </a:r>
+            <a:endParaRPr lang="en-US" altLang="ko-KR" sz="1200" b="1" dirty="0">
+              <a:latin typeface="Roboto" panose="02000000000000000000" pitchFamily="2" charset="0"/>
+            </a:endParaRPr>
+          </a:p>
+          <a:p>
+            <a:pPr marL="285750" indent="-285750">
+              <a:lnSpc>
+                <a:spcPct val="200000"/>
+              </a:lnSpc>
+              <a:buFont typeface="Arial" panose="020B0604020202020204" pitchFamily="34" charset="0"/>
+              <a:buChar char="•"/>
+            </a:pPr>
+            <a:r>
+              <a:rPr lang="ko-KR" altLang="en-US" sz="1200" dirty="0">
+                <a:latin typeface="Roboto" panose="02000000000000000000" pitchFamily="2" charset="0"/>
+              </a:rPr>
+              <a:t>세션에 대한 참가를 종료하든 종료하지 않든</a:t>
+            </a:r>
+            <a:r>
+              <a:rPr lang="en-US" altLang="ko-KR" sz="1200" dirty="0">
+                <a:latin typeface="Roboto" panose="02000000000000000000" pitchFamily="2" charset="0"/>
+              </a:rPr>
+              <a:t>, UAS core </a:t>
+            </a:r>
+            <a:r>
+              <a:rPr lang="ko-KR" altLang="en-US" sz="1200" dirty="0">
+                <a:latin typeface="Roboto" panose="02000000000000000000" pitchFamily="2" charset="0"/>
+              </a:rPr>
+              <a:t>는 </a:t>
+            </a:r>
+            <a:r>
+              <a:rPr lang="en-US" altLang="ko-KR" sz="1200" dirty="0">
+                <a:latin typeface="Roboto" panose="02000000000000000000" pitchFamily="2" charset="0"/>
+              </a:rPr>
+              <a:t>BYE </a:t>
+            </a:r>
+            <a:r>
+              <a:rPr lang="ko-KR" altLang="en-US" sz="1200" dirty="0">
+                <a:latin typeface="Roboto" panose="02000000000000000000" pitchFamily="2" charset="0"/>
+              </a:rPr>
+              <a:t>에 대해 </a:t>
+            </a:r>
+            <a:r>
+              <a:rPr lang="en-US" altLang="ko-KR" sz="1200" dirty="0">
+                <a:latin typeface="Roboto" panose="02000000000000000000" pitchFamily="2" charset="0"/>
+              </a:rPr>
+              <a:t>2xx </a:t>
+            </a:r>
+            <a:r>
+              <a:rPr lang="ko-KR" altLang="en-US" sz="1200" dirty="0">
+                <a:latin typeface="Roboto" panose="02000000000000000000" pitchFamily="2" charset="0"/>
+              </a:rPr>
+              <a:t>응답을 생성해야 하며</a:t>
+            </a:r>
+            <a:r>
+              <a:rPr lang="en-US" altLang="ko-KR" sz="1200" dirty="0">
+                <a:latin typeface="Roboto" panose="02000000000000000000" pitchFamily="2" charset="0"/>
+              </a:rPr>
+              <a:t>, </a:t>
+            </a:r>
+            <a:r>
+              <a:rPr lang="ko-KR" altLang="en-US" sz="1200" dirty="0">
+                <a:latin typeface="Roboto" panose="02000000000000000000" pitchFamily="2" charset="0"/>
+              </a:rPr>
+              <a:t>전송을 위해 </a:t>
+            </a:r>
+            <a:r>
+              <a:rPr lang="en-US" altLang="ko-KR" sz="1200" dirty="0">
+                <a:latin typeface="Roboto" panose="02000000000000000000" pitchFamily="2" charset="0"/>
+              </a:rPr>
+              <a:t>server transaction </a:t>
+            </a:r>
+            <a:r>
+              <a:rPr lang="ko-KR" altLang="en-US" sz="1200" dirty="0">
+                <a:latin typeface="Roboto" panose="02000000000000000000" pitchFamily="2" charset="0"/>
+              </a:rPr>
+              <a:t>에 이를 전달</a:t>
+            </a:r>
+            <a:endParaRPr lang="en-US" altLang="ko-KR" sz="1200" dirty="0">
+              <a:latin typeface="Roboto" panose="02000000000000000000" pitchFamily="2" charset="0"/>
+            </a:endParaRPr>
+          </a:p>
+          <a:p>
+            <a:pPr marL="285750" indent="-285750">
+              <a:lnSpc>
+                <a:spcPct val="200000"/>
+              </a:lnSpc>
+              <a:buFont typeface="Arial" panose="020B0604020202020204" pitchFamily="34" charset="0"/>
+              <a:buChar char="•"/>
+            </a:pPr>
+            <a:r>
+              <a:rPr lang="en-US" altLang="ko-KR" sz="1200" dirty="0">
+                <a:latin typeface="Roboto" panose="02000000000000000000" pitchFamily="2" charset="0"/>
+              </a:rPr>
+              <a:t>UAS </a:t>
+            </a:r>
+            <a:r>
+              <a:rPr lang="ko-KR" altLang="en-US" sz="1200" dirty="0">
+                <a:latin typeface="Roboto" panose="02000000000000000000" pitchFamily="2" charset="0"/>
+              </a:rPr>
+              <a:t>는 해당 다이얼로그에 대해 수신된 모든 보류 중인 요청에 응답해야 하며</a:t>
+            </a:r>
+            <a:r>
+              <a:rPr lang="en-US" altLang="ko-KR" sz="1200" dirty="0">
+                <a:latin typeface="Roboto" panose="02000000000000000000" pitchFamily="2" charset="0"/>
+              </a:rPr>
+              <a:t>, </a:t>
+            </a:r>
+            <a:r>
+              <a:rPr lang="ko-KR" altLang="en-US" sz="1200" dirty="0">
+                <a:latin typeface="Roboto" panose="02000000000000000000" pitchFamily="2" charset="0"/>
+              </a:rPr>
+              <a:t>이러한 보류 중인 요청에 대해 </a:t>
+            </a:r>
+            <a:r>
+              <a:rPr lang="en-US" altLang="ko-KR" sz="1200" b="1" dirty="0">
+                <a:latin typeface="Roboto" panose="02000000000000000000" pitchFamily="2" charset="0"/>
+              </a:rPr>
+              <a:t>487(Request Terminated)</a:t>
+            </a:r>
+            <a:r>
+              <a:rPr lang="en-US" altLang="ko-KR" sz="1200" dirty="0">
+                <a:latin typeface="Roboto" panose="02000000000000000000" pitchFamily="2" charset="0"/>
+              </a:rPr>
+              <a:t> </a:t>
+            </a:r>
+            <a:r>
+              <a:rPr lang="ko-KR" altLang="en-US" sz="1200" dirty="0">
+                <a:latin typeface="Roboto" panose="02000000000000000000" pitchFamily="2" charset="0"/>
+              </a:rPr>
+              <a:t>응답을 생성</a:t>
+            </a:r>
+            <a:endParaRPr lang="en-US" altLang="ko-KR" sz="1200" dirty="0">
+              <a:latin typeface="Roboto" panose="02000000000000000000" pitchFamily="2" charset="0"/>
+            </a:endParaRPr>
+          </a:p>
+        </p:txBody>
+      </p:sp>
+    </p:spTree>
+    <p:extLst>
+      <p:ext uri="{BB962C8B-B14F-4D97-AF65-F5344CB8AC3E}">
+        <p14:creationId xmlns:p14="http://schemas.microsoft.com/office/powerpoint/2010/main" val="866518293"/>
+      </p:ext>
+    </p:extLst>
+  </p:cSld>
+  <p:clrMapOvr>
+    <a:masterClrMapping/>
+  </p:clrMapOvr>
+</p:sld>
+</file>
+
+<file path=ppt/slides/slide31.xml><?xml version="1.0" encoding="utf-8"?>
+<p:sld xmlns:a="http://schemas.openxmlformats.org/drawingml/2006/main" xmlns:r="http://schemas.openxmlformats.org/officeDocument/2006/relationships" xmlns:p="http://schemas.openxmlformats.org/presentationml/2006/main">
+  <p:cSld>
+    <p:spTree>
+      <p:nvGrpSpPr>
+        <p:cNvPr id="1" name=""/>
+        <p:cNvGrpSpPr/>
+        <p:nvPr/>
+      </p:nvGrpSpPr>
+      <p:grpSpPr>
+        <a:xfrm>
+          <a:off x="0" y="0"/>
+          <a:ext cx="0" cy="0"/>
+          <a:chOff x="0" y="0"/>
+          <a:chExt cx="0" cy="0"/>
+        </a:xfrm>
+      </p:grpSpPr>
+      <p:sp>
+        <p:nvSpPr>
+          <p:cNvPr id="4" name="슬라이드 번호 개체 틀 3">
+            <a:extLst>
+              <a:ext uri="{FF2B5EF4-FFF2-40B4-BE49-F238E27FC236}">
+                <a16:creationId xmlns:a16="http://schemas.microsoft.com/office/drawing/2014/main" id="{63151CCF-057C-4F06-8A51-C3671F753532}"/>
+              </a:ext>
+            </a:extLst>
+          </p:cNvPr>
+          <p:cNvSpPr>
+            <a:spLocks noGrp="1"/>
+          </p:cNvSpPr>
+          <p:nvPr>
+            <p:ph type="sldNum" sz="quarter" idx="12"/>
+          </p:nvPr>
+        </p:nvSpPr>
+        <p:spPr/>
+        <p:txBody>
+          <a:bodyPr/>
+          <a:lstStyle/>
+          <a:p>
+            <a:fld id="{A9252A94-CC09-4928-8209-20295AE91AEF}" type="slidenum">
+              <a:rPr lang="ko-KR" altLang="en-US" smtClean="0"/>
+              <a:t>31</a:t>
+            </a:fld>
+            <a:endParaRPr lang="ko-KR" altLang="en-US" dirty="0"/>
+          </a:p>
+        </p:txBody>
+      </p:sp>
+      <p:sp>
+        <p:nvSpPr>
+          <p:cNvPr id="3" name="이등변 삼각형 2">
+            <a:extLst>
+              <a:ext uri="{FF2B5EF4-FFF2-40B4-BE49-F238E27FC236}">
+                <a16:creationId xmlns:a16="http://schemas.microsoft.com/office/drawing/2014/main" id="{46E6D6DB-00B8-886C-4AA3-D1FD38ADE844}"/>
+              </a:ext>
+            </a:extLst>
+          </p:cNvPr>
+          <p:cNvSpPr/>
+          <p:nvPr/>
+        </p:nvSpPr>
+        <p:spPr>
+          <a:xfrm rot="10800000">
+            <a:off x="3665963" y="1467955"/>
+            <a:ext cx="4860074" cy="4189719"/>
+          </a:xfrm>
+          <a:prstGeom prst="triangle">
+            <a:avLst/>
+          </a:prstGeom>
+          <a:solidFill>
+            <a:schemeClr val="tx1"/>
+          </a:solidFill>
+          <a:ln>
+            <a:noFill/>
+          </a:ln>
+        </p:spPr>
+        <p:style>
+          <a:lnRef idx="2">
+            <a:schemeClr val="accent1">
+              <a:shade val="15000"/>
+            </a:schemeClr>
+          </a:lnRef>
+          <a:fillRef idx="1">
+            <a:schemeClr val="accent1"/>
+          </a:fillRef>
+          <a:effectRef idx="0">
+            <a:schemeClr val="accent1"/>
+          </a:effectRef>
+          <a:fontRef idx="minor">
+            <a:schemeClr val="lt1"/>
+          </a:fontRef>
+        </p:style>
+        <p:txBody>
+          <a:bodyPr rtlCol="0" anchor="ctr"/>
+          <a:lstStyle/>
+          <a:p>
+            <a:pPr algn="ctr"/>
+            <a:endParaRPr lang="ko-KR" altLang="en-US" dirty="0"/>
+          </a:p>
+        </p:txBody>
+      </p:sp>
+      <p:sp>
+        <p:nvSpPr>
+          <p:cNvPr id="5" name="TextBox 4">
+            <a:extLst>
+              <a:ext uri="{FF2B5EF4-FFF2-40B4-BE49-F238E27FC236}">
+                <a16:creationId xmlns:a16="http://schemas.microsoft.com/office/drawing/2014/main" id="{2C4EDA3F-1542-B44B-C801-83CCECD10FBF}"/>
+              </a:ext>
+            </a:extLst>
+          </p:cNvPr>
+          <p:cNvSpPr txBox="1"/>
+          <p:nvPr/>
+        </p:nvSpPr>
+        <p:spPr>
+          <a:xfrm>
+            <a:off x="5229416" y="2362485"/>
+            <a:ext cx="1733167" cy="1200329"/>
+          </a:xfrm>
+          <a:prstGeom prst="rect">
+            <a:avLst/>
+          </a:prstGeom>
+          <a:noFill/>
+        </p:spPr>
+        <p:txBody>
+          <a:bodyPr wrap="none" rtlCol="0">
+            <a:spAutoFit/>
+          </a:bodyPr>
+          <a:lstStyle/>
+          <a:p>
+            <a:pPr algn="ctr"/>
+            <a:r>
+              <a:rPr lang="en-US" altLang="ko-KR" sz="3600" dirty="0">
+                <a:solidFill>
+                  <a:schemeClr val="bg1"/>
+                </a:solidFill>
+                <a:latin typeface="+mj-lt"/>
+              </a:rPr>
+              <a:t>THANK</a:t>
+            </a:r>
+          </a:p>
+          <a:p>
+            <a:pPr algn="ctr"/>
+            <a:r>
+              <a:rPr lang="en-US" altLang="ko-KR" sz="3600" dirty="0">
+                <a:solidFill>
+                  <a:schemeClr val="bg1"/>
+                </a:solidFill>
+                <a:latin typeface="+mj-lt"/>
+              </a:rPr>
+              <a:t>YOU</a:t>
+            </a:r>
+            <a:endParaRPr lang="ko-KR" altLang="en-US" sz="3600" dirty="0">
+              <a:solidFill>
+                <a:schemeClr val="bg1"/>
+              </a:solidFill>
+              <a:latin typeface="+mj-lt"/>
+            </a:endParaRPr>
+          </a:p>
+        </p:txBody>
+      </p:sp>
+    </p:spTree>
+    <p:extLst>
+      <p:ext uri="{BB962C8B-B14F-4D97-AF65-F5344CB8AC3E}">
+        <p14:creationId xmlns:p14="http://schemas.microsoft.com/office/powerpoint/2010/main" val="1137186482"/>
+      </p:ext>
+    </p:extLst>
+  </p:cSld>
+  <p:clrMapOvr>
+    <a:masterClrMapping/>
+  </p:clrMapOvr>
+</p:sld>
+</file>
+
 <file path=ppt/slides/slide4.xml><?xml version="1.0" encoding="utf-8"?>
 <p:sld xmlns:a="http://schemas.openxmlformats.org/drawingml/2006/main" xmlns:r="http://schemas.openxmlformats.org/officeDocument/2006/relationships" xmlns:p="http://schemas.openxmlformats.org/presentationml/2006/main">
   <p:cSld>
@@ -22054,7 +24167,7 @@
         <p:spPr>
           <a:xfrm>
             <a:off x="838200" y="876920"/>
-            <a:ext cx="7234801" cy="5538247"/>
+            <a:ext cx="7234801" cy="5261248"/>
           </a:xfrm>
           <a:prstGeom prst="rect">
             <a:avLst/>
@@ -22073,7 +24186,7 @@
               </a:lnSpc>
             </a:pPr>
             <a:r>
-              <a:rPr lang="en-US" altLang="ko-KR" sz="1400" b="1" u="sng">
+              <a:rPr lang="en-US" altLang="ko-KR" sz="1400" b="1" u="sng" dirty="0">
                 <a:latin typeface="Roboto" panose="02000000000000000000" pitchFamily="2" charset="0"/>
                 <a:ea typeface="Roboto" panose="02000000000000000000" pitchFamily="2" charset="0"/>
               </a:rPr>
@@ -22089,24 +24202,24 @@
               <a:buChar char="•"/>
             </a:pPr>
             <a:r>
-              <a:rPr lang="ko-KR" altLang="en-US" sz="1200">
+              <a:rPr lang="ko-KR" altLang="en-US" sz="1200" dirty="0">
                 <a:latin typeface="+mn-ea"/>
               </a:rPr>
               <a:t>사용자의 공개 주소 </a:t>
             </a:r>
             <a:r>
-              <a:rPr lang="en-US" altLang="ko-KR" sz="1200">
+              <a:rPr lang="en-US" altLang="ko-KR" sz="1200" dirty="0">
                 <a:latin typeface="+mn-ea"/>
               </a:rPr>
               <a:t>(public address)</a:t>
             </a:r>
             <a:r>
-              <a:rPr lang="ko-KR" altLang="en-US" sz="1200">
+              <a:rPr lang="ko-KR" altLang="en-US" sz="1200" dirty="0">
                 <a:latin typeface="+mn-ea"/>
               </a:rPr>
               <a:t>로 간주</a:t>
             </a:r>
-            <a:endParaRPr lang="en-US" altLang="ko-KR" sz="1200">
+            <a:endParaRPr lang="en-US" altLang="ko-KR" sz="1200" dirty="0">
               <a:latin typeface="+mn-ea"/>
             </a:endParaRPr>
           </a:p>
@@ -22119,12 +24232,12 @@
               <a:buChar char="•"/>
             </a:pPr>
             <a:r>
-              <a:rPr lang="ko-KR" altLang="en-US" sz="1200">
+              <a:rPr lang="ko-KR" altLang="en-US" sz="1200" dirty="0">
                 <a:latin typeface="+mn-ea"/>
               </a:rPr>
               <a:t>사용자를 식별하기 위한 주소로 사용</a:t>
             </a:r>
-            <a:endParaRPr lang="en-US" altLang="ko-KR" sz="1200">
+            <a:endParaRPr lang="en-US" altLang="ko-KR" sz="1200" dirty="0">
               <a:latin typeface="+mn-ea"/>
             </a:endParaRPr>
           </a:p>
@@ -22137,36 +24250,36 @@
               <a:buChar char="•"/>
             </a:pPr>
             <a:r>
-              <a:rPr lang="ko-KR" altLang="en-US" sz="1200">
+              <a:rPr lang="ko-KR" altLang="en-US" sz="1200" dirty="0">
                 <a:latin typeface="+mn-ea"/>
               </a:rPr>
               <a:t>일반적으로 </a:t>
             </a:r>
             <a:r>
-              <a:rPr lang="en-US" altLang="ko-KR" sz="1200">
+              <a:rPr lang="en-US" altLang="ko-KR" sz="1200" dirty="0">
                 <a:latin typeface="+mn-ea"/>
               </a:rPr>
               <a:t>SIP or SIPS URI </a:t>
             </a:r>
             <a:r>
-              <a:rPr lang="ko-KR" altLang="en-US" sz="1200">
+              <a:rPr lang="ko-KR" altLang="en-US" sz="1200" dirty="0">
                 <a:latin typeface="+mn-ea"/>
               </a:rPr>
               <a:t>형식이며</a:t>
             </a:r>
             <a:r>
-              <a:rPr lang="en-US" altLang="ko-KR" sz="1200">
+              <a:rPr lang="en-US" altLang="ko-KR" sz="1200" dirty="0">
                 <a:latin typeface="+mn-ea"/>
               </a:rPr>
               <a:t>, </a:t>
             </a:r>
             <a:r>
-              <a:rPr lang="ko-KR" altLang="en-US" sz="1200">
+              <a:rPr lang="ko-KR" altLang="en-US" sz="1200" dirty="0">
                 <a:latin typeface="+mn-ea"/>
               </a:rPr>
               <a:t>도메인을 포함</a:t>
             </a:r>
-            <a:endParaRPr lang="en-US" altLang="ko-KR" sz="1200">
+            <a:endParaRPr lang="en-US" altLang="ko-KR" sz="1200" dirty="0">
               <a:latin typeface="+mn-ea"/>
             </a:endParaRPr>
           </a:p>
@@ -22179,37 +24292,37 @@
               <a:buChar char="•"/>
             </a:pPr>
             <a:r>
-              <a:rPr lang="en-US" altLang="ko-KR" sz="1200">
+              <a:rPr lang="en-US" altLang="ko-KR" sz="1200" dirty="0">
                 <a:latin typeface="Roboto" panose="02000000000000000000" pitchFamily="2" charset="0"/>
                 <a:ea typeface="Roboto" panose="02000000000000000000" pitchFamily="2" charset="0"/>
               </a:rPr>
               <a:t>ex)</a:t>
             </a:r>
             <a:r>
-              <a:rPr lang="ko-KR" altLang="en-US" sz="1200">
+              <a:rPr lang="ko-KR" altLang="en-US" sz="1200" dirty="0">
                 <a:latin typeface="Roboto" panose="02000000000000000000" pitchFamily="2" charset="0"/>
               </a:rPr>
               <a:t> </a:t>
             </a:r>
             <a:r>
-              <a:rPr lang="en-US" altLang="ko-KR" sz="1200" err="1">
+              <a:rPr lang="en-US" altLang="ko-KR" sz="1200" dirty="0" err="1">
                 <a:latin typeface="Roboto" panose="02000000000000000000" pitchFamily="2" charset="0"/>
                 <a:ea typeface="Roboto" panose="02000000000000000000" pitchFamily="2" charset="0"/>
               </a:rPr>
               <a:t>sip:alice@example.com</a:t>
             </a:r>
-            <a:endParaRPr lang="en-US" altLang="ko-KR" sz="1200">
+            <a:endParaRPr lang="en-US" altLang="ko-KR" sz="1200" dirty="0">
               <a:latin typeface="Roboto" panose="02000000000000000000" pitchFamily="2" charset="0"/>
               <a:ea typeface="Roboto" panose="02000000000000000000" pitchFamily="2" charset="0"/>
             </a:endParaRPr>
           </a:p>
           <a:p>
             <a:pPr defTabSz="360000"/>
-            <a:endParaRPr lang="en-US" altLang="ko-KR" sz="1400" b="1"/>
+            <a:endParaRPr lang="en-US" altLang="ko-KR" sz="1400" b="1" dirty="0"/>
           </a:p>
           <a:p>
             <a:pPr defTabSz="360000"/>
-            <a:endParaRPr lang="en-US" altLang="ko-KR" sz="1400" b="1"/>
+            <a:endParaRPr lang="en-US" altLang="ko-KR" sz="1400" b="1" dirty="0"/>
           </a:p>
           <a:p>
             <a:pPr defTabSz="360000">
@@ -22218,20 +24331,20 @@
               </a:lnSpc>
             </a:pPr>
             <a:r>
-              <a:rPr lang="en-US" altLang="ko-KR" sz="1400" b="1" u="sng">
+              <a:rPr lang="en-US" altLang="ko-KR" sz="1400" b="1" u="sng" dirty="0">
                 <a:latin typeface="Roboto" panose="02000000000000000000" pitchFamily="2" charset="0"/>
                 <a:ea typeface="Roboto" panose="02000000000000000000" pitchFamily="2" charset="0"/>
               </a:rPr>
               <a:t>Location</a:t>
             </a:r>
             <a:r>
-              <a:rPr lang="ko-KR" altLang="en-US" sz="1400" b="1" u="sng">
+              <a:rPr lang="ko-KR" altLang="en-US" sz="1400" b="1" u="sng" dirty="0">
                 <a:latin typeface="Roboto" panose="02000000000000000000" pitchFamily="2" charset="0"/>
               </a:rPr>
               <a:t> </a:t>
             </a:r>
             <a:r>
-              <a:rPr lang="en-US" altLang="ko-KR" sz="1400" b="1" u="sng">
+              <a:rPr lang="en-US" altLang="ko-KR" sz="1400" b="1" u="sng" dirty="0">
                 <a:latin typeface="Roboto" panose="02000000000000000000" pitchFamily="2" charset="0"/>
                 <a:ea typeface="Roboto" panose="02000000000000000000" pitchFamily="2" charset="0"/>
               </a:rPr>
@@ -22247,22 +24360,22 @@
               <a:buChar char="•"/>
             </a:pPr>
             <a:r>
-              <a:rPr lang="en-US" altLang="ko-KR" sz="1200"/>
+              <a:rPr lang="en-US" altLang="ko-KR" sz="1200" dirty="0"/>
               <a:t>address-of-record</a:t>
             </a:r>
             <a:r>
-              <a:rPr lang="ko-KR" altLang="en-US" sz="1200"/>
+              <a:rPr lang="ko-KR" altLang="en-US" sz="1200" dirty="0"/>
               <a:t>의 </a:t>
             </a:r>
             <a:r>
-              <a:rPr lang="en-US" altLang="ko-KR" sz="1200"/>
+              <a:rPr lang="en-US" altLang="ko-KR" sz="1200" dirty="0"/>
               <a:t>contact address binding </a:t>
             </a:r>
             <a:r>
-              <a:rPr lang="ko-KR" altLang="en-US" sz="1200"/>
+              <a:rPr lang="ko-KR" altLang="en-US" sz="1200" dirty="0"/>
               <a:t>정보를 저장하고 있는 데이터 베이스</a:t>
             </a:r>
-            <a:endParaRPr lang="en-US" altLang="ko-KR" sz="1200"/>
+            <a:endParaRPr lang="en-US" altLang="ko-KR" sz="1200" dirty="0"/>
           </a:p>
           <a:p>
             <a:pPr marL="171450" indent="-171450" defTabSz="360000">
@@ -22273,40 +24386,40 @@
               <a:buChar char="•"/>
             </a:pPr>
             <a:r>
-              <a:rPr lang="en-US" altLang="ko-KR" sz="1200"/>
+              <a:rPr lang="en-US" altLang="ko-KR" sz="1200" dirty="0"/>
               <a:t>callee</a:t>
             </a:r>
             <a:r>
-              <a:rPr lang="ko-KR" altLang="en-US" sz="1200"/>
+              <a:rPr lang="ko-KR" altLang="en-US" sz="1200" dirty="0"/>
               <a:t>의 위치 정보를 얻기 위해 </a:t>
             </a:r>
             <a:r>
-              <a:rPr lang="en-US" altLang="ko-KR" sz="1200"/>
+              <a:rPr lang="en-US" altLang="ko-KR" sz="1200" dirty="0"/>
               <a:t>SIP redirect</a:t>
             </a:r>
             <a:r>
-              <a:rPr lang="ko-KR" altLang="en-US" sz="1200"/>
+              <a:rPr lang="ko-KR" altLang="en-US" sz="1200" dirty="0"/>
               <a:t> 또는 </a:t>
             </a:r>
             <a:r>
-              <a:rPr lang="en-US" altLang="ko-KR" sz="1200"/>
+              <a:rPr lang="en-US" altLang="ko-KR" sz="1200" dirty="0"/>
               <a:t>Proxy </a:t>
             </a:r>
             <a:r>
-              <a:rPr lang="ko-KR" altLang="en-US" sz="1200"/>
+              <a:rPr lang="ko-KR" altLang="en-US" sz="1200" dirty="0"/>
               <a:t>서버가 사용</a:t>
             </a:r>
-            <a:endParaRPr lang="en-US" altLang="ko-KR" sz="1200"/>
+            <a:endParaRPr lang="en-US" altLang="ko-KR" sz="1200" dirty="0"/>
           </a:p>
           <a:p>
             <a:pPr defTabSz="360000"/>
-            <a:endParaRPr lang="en-US" altLang="ko-KR" sz="1400">
+            <a:endParaRPr lang="en-US" altLang="ko-KR" sz="1400" dirty="0">
               <a:latin typeface="+mn-ea"/>
             </a:endParaRPr>
           </a:p>
           <a:p>
             <a:pPr defTabSz="360000"/>
-            <a:endParaRPr lang="en-US" altLang="ko-KR" sz="1400">
+            <a:endParaRPr lang="en-US" altLang="ko-KR" sz="1400" dirty="0">
               <a:latin typeface="+mn-ea"/>
             </a:endParaRPr>
           </a:p>
@@ -22317,32 +24430,32 @@
               </a:lnSpc>
             </a:pPr>
             <a:r>
-              <a:rPr lang="en-US" altLang="ko-KR" sz="1400" b="1" u="sng">
+              <a:rPr lang="en-US" altLang="ko-KR" sz="1400" b="1" u="sng" dirty="0">
                 <a:latin typeface="Roboto" panose="02000000000000000000" pitchFamily="2" charset="0"/>
                 <a:ea typeface="Roboto" panose="02000000000000000000" pitchFamily="2" charset="0"/>
               </a:rPr>
               <a:t>Registration</a:t>
             </a:r>
             <a:r>
-              <a:rPr lang="en-US" altLang="ko-KR" sz="1400" b="1">
+              <a:rPr lang="en-US" altLang="ko-KR" sz="1400" b="1" dirty="0">
                 <a:latin typeface="+mj-lt"/>
               </a:rPr>
               <a:t> </a:t>
             </a:r>
             <a:r>
-              <a:rPr lang="en-US" altLang="ko-KR" sz="1200">
+              <a:rPr lang="en-US" altLang="ko-KR" sz="1200" dirty="0">
                 <a:latin typeface="+mj-lt"/>
               </a:rPr>
               <a:t>(</a:t>
             </a:r>
             <a:r>
-              <a:rPr lang="ko-KR" altLang="en-US" sz="1200">
+              <a:rPr lang="ko-KR" altLang="en-US" sz="1200" dirty="0">
                 <a:latin typeface="+mj-lt"/>
               </a:rPr>
               <a:t>등록 절차</a:t>
             </a:r>
             <a:r>
-              <a:rPr lang="en-US" altLang="ko-KR" sz="1200">
+              <a:rPr lang="en-US" altLang="ko-KR" sz="1200" dirty="0">
                 <a:latin typeface="+mj-lt"/>
               </a:rPr>
               <a:t>)</a:t>
@@ -22355,60 +24468,60 @@
               </a:lnSpc>
             </a:pPr>
             <a:r>
-              <a:rPr lang="ko-KR" altLang="en-US" sz="1200">
+              <a:rPr lang="ko-KR" altLang="en-US" sz="1200" dirty="0">
                 <a:latin typeface="+mn-ea"/>
               </a:rPr>
               <a:t>특정 도메인에 대한 </a:t>
             </a:r>
             <a:r>
-              <a:rPr lang="en-US" altLang="ko-KR" sz="1200">
+              <a:rPr lang="en-US" altLang="ko-KR" sz="1200" dirty="0">
                 <a:latin typeface="+mn-ea"/>
               </a:rPr>
               <a:t>address-of-record</a:t>
             </a:r>
             <a:r>
-              <a:rPr lang="ko-KR" altLang="en-US" sz="1200">
+              <a:rPr lang="ko-KR" altLang="en-US" sz="1200" dirty="0">
                 <a:latin typeface="+mn-ea"/>
               </a:rPr>
               <a:t>와 </a:t>
             </a:r>
             <a:r>
-              <a:rPr lang="en-US" altLang="ko-KR" sz="1200">
+              <a:rPr lang="en-US" altLang="ko-KR" sz="1200" dirty="0">
                 <a:latin typeface="+mn-ea"/>
               </a:rPr>
               <a:t>contact address</a:t>
             </a:r>
             <a:r>
-              <a:rPr lang="ko-KR" altLang="en-US" sz="1200">
+              <a:rPr lang="ko-KR" altLang="en-US" sz="1200" dirty="0">
                 <a:latin typeface="+mn-ea"/>
               </a:rPr>
               <a:t>간 </a:t>
             </a:r>
             <a:r>
-              <a:rPr lang="en-US" altLang="ko-KR" sz="1200">
+              <a:rPr lang="en-US" altLang="ko-KR" sz="1200" dirty="0">
                 <a:latin typeface="+mn-ea"/>
               </a:rPr>
               <a:t>binding </a:t>
             </a:r>
             <a:r>
-              <a:rPr lang="ko-KR" altLang="en-US" sz="1200">
+              <a:rPr lang="ko-KR" altLang="en-US" sz="1200" dirty="0">
                 <a:latin typeface="+mn-ea"/>
               </a:rPr>
               <a:t>을 </a:t>
             </a:r>
             <a:r>
-              <a:rPr lang="en-US" altLang="ko-KR" sz="1200">
+              <a:rPr lang="en-US" altLang="ko-KR" sz="1200" dirty="0">
                 <a:latin typeface="+mn-ea"/>
               </a:rPr>
               <a:t>location service</a:t>
             </a:r>
             <a:r>
-              <a:rPr lang="ko-KR" altLang="en-US" sz="1200">
+              <a:rPr lang="ko-KR" altLang="en-US" sz="1200" dirty="0">
                 <a:latin typeface="+mn-ea"/>
               </a:rPr>
               <a:t>에 생성하는 절차</a:t>
             </a:r>
-            <a:endParaRPr lang="en-US" altLang="ko-KR" sz="1200">
+            <a:endParaRPr lang="en-US" altLang="ko-KR" sz="1200" dirty="0">
               <a:latin typeface="+mn-ea"/>
             </a:endParaRPr>
           </a:p>
@@ -22418,7 +24531,7 @@
                 <a:spcPct val="150000"/>
               </a:lnSpc>
             </a:pPr>
-            <a:endParaRPr lang="en-US" altLang="ko-KR" sz="1200">
+            <a:endParaRPr lang="en-US" altLang="ko-KR" sz="1200" dirty="0">
               <a:latin typeface="+mn-ea"/>
             </a:endParaRPr>
           </a:p>
@@ -22428,24 +24541,14 @@
                 <a:spcPct val="150000"/>
               </a:lnSpc>
             </a:pPr>
-            <a:endParaRPr lang="en-US" altLang="ko-KR" sz="1200">
-              <a:latin typeface="+mn-ea"/>
-            </a:endParaRPr>
-          </a:p>
-          <a:p>
-            <a:pPr defTabSz="360000">
-              <a:lnSpc>
-                <a:spcPct val="150000"/>
-              </a:lnSpc>
-            </a:pPr>
-            <a:r>
-              <a:rPr lang="en-US" altLang="ko-KR" sz="1400" b="1" u="sng">
+            <a:r>
+              <a:rPr lang="en-US" altLang="ko-KR" sz="1400" b="1" u="sng" dirty="0">
                 <a:latin typeface="Roboto" panose="02000000000000000000" pitchFamily="2" charset="0"/>
                 <a:ea typeface="Roboto" panose="02000000000000000000" pitchFamily="2" charset="0"/>
               </a:rPr>
               <a:t>Registrar</a:t>
             </a:r>
-            <a:endParaRPr lang="en-US" altLang="ko-KR" sz="1200" b="1" u="sng">
+            <a:endParaRPr lang="en-US" altLang="ko-KR" sz="1200" b="1" u="sng" dirty="0">
               <a:latin typeface="Roboto" panose="02000000000000000000" pitchFamily="2" charset="0"/>
               <a:ea typeface="Roboto" panose="02000000000000000000" pitchFamily="2" charset="0"/>
             </a:endParaRPr>
@@ -22459,66 +24562,66 @@
               <a:buChar char="•"/>
             </a:pPr>
             <a:r>
-              <a:rPr lang="en-US" altLang="ko-KR" sz="1200">
+              <a:rPr lang="en-US" altLang="ko-KR" sz="1200" dirty="0">
                 <a:latin typeface="+mn-ea"/>
               </a:rPr>
               <a:t>REGISTER </a:t>
             </a:r>
             <a:r>
-              <a:rPr lang="ko-KR" altLang="en-US" sz="1200">
+              <a:rPr lang="ko-KR" altLang="en-US" sz="1200" dirty="0">
                 <a:latin typeface="+mn-ea"/>
               </a:rPr>
               <a:t>요청을 받고</a:t>
             </a:r>
             <a:r>
-              <a:rPr lang="en-US" altLang="ko-KR" sz="1200">
+              <a:rPr lang="en-US" altLang="ko-KR" sz="1200" dirty="0">
                 <a:latin typeface="+mn-ea"/>
               </a:rPr>
               <a:t>, </a:t>
             </a:r>
             <a:r>
-              <a:rPr lang="ko-KR" altLang="en-US" sz="1200">
+              <a:rPr lang="ko-KR" altLang="en-US" sz="1200" dirty="0">
                 <a:latin typeface="+mn-ea"/>
               </a:rPr>
               <a:t>그 요청에서 받은 정보를 </a:t>
             </a:r>
             <a:r>
-              <a:rPr lang="en-US" altLang="ko-KR" sz="1200">
+              <a:rPr lang="en-US" altLang="ko-KR" sz="1200" dirty="0">
                 <a:latin typeface="+mn-ea"/>
               </a:rPr>
               <a:t>registrar</a:t>
             </a:r>
             <a:r>
-              <a:rPr lang="ko-KR" altLang="en-US" sz="1200">
+              <a:rPr lang="ko-KR" altLang="en-US" sz="1200" dirty="0">
                 <a:latin typeface="+mn-ea"/>
               </a:rPr>
               <a:t>가 다루는 도메인을 위한 </a:t>
             </a:r>
             <a:r>
-              <a:rPr lang="en-US" altLang="ko-KR" sz="1200">
+              <a:rPr lang="en-US" altLang="ko-KR" sz="1200" dirty="0">
                 <a:latin typeface="+mn-ea"/>
               </a:rPr>
               <a:t>location service</a:t>
             </a:r>
             <a:r>
-              <a:rPr lang="ko-KR" altLang="en-US" sz="1200">
+              <a:rPr lang="ko-KR" altLang="en-US" sz="1200" dirty="0">
                 <a:latin typeface="+mn-ea"/>
               </a:rPr>
               <a:t> 에 저장</a:t>
             </a:r>
             <a:br>
-              <a:rPr lang="en-US" altLang="ko-KR" sz="1200">
+              <a:rPr lang="en-US" altLang="ko-KR" sz="1200" dirty="0">
                 <a:latin typeface="+mn-ea"/>
               </a:rPr>
             </a:br>
             <a:r>
-              <a:rPr lang="ko-KR" altLang="en-US" sz="1200">
+              <a:rPr lang="ko-KR" altLang="en-US" sz="1200" dirty="0">
                 <a:latin typeface="+mn-ea"/>
               </a:rPr>
               <a:t>하는 특수한 유형의 </a:t>
             </a:r>
             <a:r>
-              <a:rPr lang="en-US" altLang="ko-KR" sz="1200">
+              <a:rPr lang="en-US" altLang="ko-KR" sz="1200" dirty="0">
                 <a:latin typeface="+mn-ea"/>
               </a:rPr>
               <a:t>UAS</a:t>
@@ -22533,42 +24636,42 @@
               <a:buChar char="•"/>
             </a:pPr>
             <a:r>
-              <a:rPr lang="en-US" altLang="ko-KR" sz="1200">
+              <a:rPr lang="en-US" altLang="ko-KR" sz="1200" dirty="0">
                 <a:latin typeface="+mn-ea"/>
               </a:rPr>
               <a:t>location service </a:t>
             </a:r>
             <a:r>
-              <a:rPr lang="ko-KR" altLang="en-US" sz="1200">
+              <a:rPr lang="ko-KR" altLang="en-US" sz="1200" dirty="0">
                 <a:latin typeface="+mn-ea"/>
               </a:rPr>
               <a:t>의 프론트 엔드 역할로</a:t>
             </a:r>
             <a:r>
-              <a:rPr lang="en-US" altLang="ko-KR" sz="1200">
+              <a:rPr lang="en-US" altLang="ko-KR" sz="1200" dirty="0">
                 <a:latin typeface="+mn-ea"/>
               </a:rPr>
               <a:t>, REGISTER </a:t>
             </a:r>
             <a:r>
-              <a:rPr lang="ko-KR" altLang="en-US" sz="1200">
+              <a:rPr lang="ko-KR" altLang="en-US" sz="1200" dirty="0">
                 <a:latin typeface="+mn-ea"/>
               </a:rPr>
               <a:t>내용을 기반으로 매핑하고 읽고</a:t>
             </a:r>
             <a:r>
-              <a:rPr lang="en-US" altLang="ko-KR" sz="1200">
+              <a:rPr lang="en-US" altLang="ko-KR" sz="1200" dirty="0">
                 <a:latin typeface="+mn-ea"/>
               </a:rPr>
               <a:t>, </a:t>
             </a:r>
             <a:r>
-              <a:rPr lang="ko-KR" altLang="en-US" sz="1200">
+              <a:rPr lang="ko-KR" altLang="en-US" sz="1200" dirty="0">
                 <a:latin typeface="+mn-ea"/>
               </a:rPr>
               <a:t>쓰기 가능</a:t>
             </a:r>
-            <a:endParaRPr lang="en-US" altLang="ko-KR" sz="1200">
+            <a:endParaRPr lang="en-US" altLang="ko-KR" sz="1200" dirty="0">
               <a:latin typeface="+mn-ea"/>
             </a:endParaRPr>
           </a:p>
@@ -23884,13 +25987,13 @@
             <a:lstStyle/>
             <a:p>
               <a:r>
-                <a:rPr lang="en-US" altLang="ko-KR" sz="1200">
+                <a:rPr lang="en-US" altLang="ko-KR" sz="1200" dirty="0">
                   <a:latin typeface="Roboto" panose="02000000000000000000" pitchFamily="2" charset="0"/>
                   <a:ea typeface="Roboto" panose="02000000000000000000" pitchFamily="2" charset="0"/>
                 </a:rPr>
                 <a:t>Bob</a:t>
               </a:r>
-              <a:endParaRPr lang="ko-KR" altLang="en-US" sz="1200">
+              <a:endParaRPr lang="ko-KR" altLang="en-US" sz="1200" dirty="0">
                 <a:latin typeface="Roboto" panose="02000000000000000000" pitchFamily="2" charset="0"/>
               </a:endParaRPr>
             </a:p>
@@ -27544,125 +29647,6 @@
       </p:sp>
       <p:sp>
         <p:nvSpPr>
-          <p:cNvPr id="50" name="직사각형 49">
-            <a:extLst>
-              <a:ext uri="{FF2B5EF4-FFF2-40B4-BE49-F238E27FC236}">
-                <a16:creationId xmlns:a16="http://schemas.microsoft.com/office/drawing/2014/main" id="{6BD71A7F-E7DB-44B6-A054-AC0FCA4BB57F}"/>
-              </a:ext>
-            </a:extLst>
-          </p:cNvPr>
-          <p:cNvSpPr/>
-          <p:nvPr/>
-        </p:nvSpPr>
-        <p:spPr>
-          <a:xfrm>
-            <a:off x="751367" y="865998"/>
-            <a:ext cx="11147556" cy="706155"/>
-          </a:xfrm>
-          <a:prstGeom prst="rect">
-            <a:avLst/>
-          </a:prstGeom>
-        </p:spPr>
-        <p:txBody>
-          <a:bodyPr wrap="square">
-            <a:spAutoFit/>
-          </a:bodyPr>
-          <a:lstStyle/>
-          <a:p>
-            <a:pPr>
-              <a:lnSpc>
-                <a:spcPct val="150000"/>
-              </a:lnSpc>
-            </a:pPr>
-            <a:r>
-              <a:rPr lang="en-US" altLang="ko-KR" sz="1600" b="1" u="sng">
-                <a:latin typeface="Roboto" panose="02000000000000000000" pitchFamily="2" charset="0"/>
-              </a:rPr>
-              <a:t>Setting the Interval Clock</a:t>
-            </a:r>
-          </a:p>
-          <a:p>
-            <a:pPr marL="285750" indent="-285750">
-              <a:lnSpc>
-                <a:spcPct val="150000"/>
-              </a:lnSpc>
-              <a:buFont typeface="Arial" panose="020B0604020202020204" pitchFamily="34" charset="0"/>
-              <a:buChar char="•"/>
-            </a:pPr>
-            <a:r>
-              <a:rPr lang="en-US" altLang="ko-KR" sz="1200" b="1">
-                <a:latin typeface="+mn-ea"/>
-              </a:rPr>
-              <a:t>RETGISTER</a:t>
-            </a:r>
-            <a:r>
-              <a:rPr lang="en-US" altLang="ko-KR" sz="1200">
-                <a:latin typeface="+mn-ea"/>
-              </a:rPr>
-              <a:t> </a:t>
-            </a:r>
-            <a:r>
-              <a:rPr lang="ko-KR" altLang="en-US" sz="1200">
-                <a:latin typeface="+mn-ea"/>
-              </a:rPr>
-              <a:t>요청에 대한 응답에 </a:t>
-            </a:r>
-            <a:r>
-              <a:rPr lang="en-US" altLang="ko-KR" sz="1200" b="1">
-                <a:latin typeface="+mn-ea"/>
-              </a:rPr>
-              <a:t>Date</a:t>
-            </a:r>
-            <a:r>
-              <a:rPr lang="en-US" altLang="ko-KR" sz="1200">
-                <a:latin typeface="+mn-ea"/>
-              </a:rPr>
-              <a:t> </a:t>
-            </a:r>
-            <a:r>
-              <a:rPr lang="ko-KR" altLang="en-US" sz="1200">
-                <a:latin typeface="+mn-ea"/>
-              </a:rPr>
-              <a:t>헤더가 포함된 경우 클라이언트는 </a:t>
-            </a:r>
-            <a:r>
-              <a:rPr lang="en-US" altLang="ko-KR" sz="1200" b="1">
-                <a:latin typeface="+mn-ea"/>
-              </a:rPr>
-              <a:t>internal clock</a:t>
-            </a:r>
-            <a:r>
-              <a:rPr lang="en-US" altLang="ko-KR" sz="1200">
-                <a:latin typeface="+mn-ea"/>
-              </a:rPr>
-              <a:t> </a:t>
-            </a:r>
-            <a:r>
-              <a:rPr lang="ko-KR" altLang="en-US" sz="1200">
-                <a:latin typeface="+mn-ea"/>
-              </a:rPr>
-              <a:t>을 설정하기 위해  이 헤더 값을 사용하여 </a:t>
-            </a:r>
-            <a:r>
-              <a:rPr lang="ko-KR" altLang="en-US" sz="1200" b="1">
-                <a:latin typeface="+mn-ea"/>
-              </a:rPr>
-              <a:t>현재 시간</a:t>
-            </a:r>
-            <a:r>
-              <a:rPr lang="ko-KR" altLang="en-US" sz="1200">
-                <a:latin typeface="+mn-ea"/>
-              </a:rPr>
-              <a:t>을 계산</a:t>
-            </a:r>
-            <a:endParaRPr lang="en-US" altLang="ko-KR" sz="1200">
-              <a:latin typeface="+mn-ea"/>
-            </a:endParaRPr>
-          </a:p>
-        </p:txBody>
-      </p:sp>
-      <p:sp>
-        <p:nvSpPr>
           <p:cNvPr id="7" name="직사각형 6">
             <a:extLst>
               <a:ext uri="{FF2B5EF4-FFF2-40B4-BE49-F238E27FC236}">
@@ -27675,7 +29659,7 @@
         </p:nvSpPr>
         <p:spPr>
           <a:xfrm>
-            <a:off x="751367" y="1888876"/>
+            <a:off x="751367" y="1282026"/>
             <a:ext cx="11147556" cy="1537152"/>
           </a:xfrm>
           <a:prstGeom prst="rect">
@@ -27890,7 +29874,7 @@
         </p:nvGrpSpPr>
         <p:grpSpPr>
           <a:xfrm>
-            <a:off x="8024779" y="3365524"/>
+            <a:off x="8024779" y="2758674"/>
             <a:ext cx="3500061" cy="830997"/>
             <a:chOff x="5436124" y="4092427"/>
             <a:chExt cx="3500061" cy="830997"/>
@@ -28059,7 +30043,7 @@
         </p:nvCxnSpPr>
         <p:spPr>
           <a:xfrm>
-            <a:off x="9982200" y="2988297"/>
+            <a:off x="9982200" y="2381447"/>
             <a:ext cx="1207416" cy="377227"/>
           </a:xfrm>
           <a:prstGeom prst="bentConnector3">
@@ -28102,7 +30086,7 @@
         </p:nvSpPr>
         <p:spPr>
           <a:xfrm>
-            <a:off x="751367" y="3742751"/>
+            <a:off x="751367" y="3135901"/>
             <a:ext cx="11147556" cy="1260153"/>
           </a:xfrm>
           <a:prstGeom prst="rect">
@@ -28311,7 +30295,7 @@
         </p:nvSpPr>
         <p:spPr>
           <a:xfrm>
-            <a:off x="751367" y="5247295"/>
+            <a:off x="751367" y="4640445"/>
             <a:ext cx="11147556" cy="983154"/>
           </a:xfrm>
           <a:prstGeom prst="rect">

</xml_diff>